<commit_message>
Create forms, code and file pptx
</commit_message>
<xml_diff>
--- a/Abilympics3.0.pptx
+++ b/Abilympics3.0.pptx
@@ -2,8 +2,27 @@
 <file path=ppt/presentation.xml><?xml version="1.0" encoding="utf-8"?>
 <p:presentation xmlns:a="http://schemas.openxmlformats.org/drawingml/2006/main" xmlns:r="http://schemas.openxmlformats.org/officeDocument/2006/relationships" xmlns:p="http://schemas.openxmlformats.org/presentationml/2006/main" saveSubsetFonts="1">
   <p:sldMasterIdLst>
-    <p:sldMasterId id="2147483648" r:id="rId1"/>
+    <p:sldMasterId id="2147483660" r:id="rId1"/>
   </p:sldMasterIdLst>
+  <p:sldIdLst>
+    <p:sldId id="256" r:id="rId2"/>
+    <p:sldId id="257" r:id="rId3"/>
+    <p:sldId id="258" r:id="rId4"/>
+    <p:sldId id="259" r:id="rId5"/>
+    <p:sldId id="260" r:id="rId6"/>
+    <p:sldId id="261" r:id="rId7"/>
+    <p:sldId id="262" r:id="rId8"/>
+    <p:sldId id="263" r:id="rId9"/>
+    <p:sldId id="264" r:id="rId10"/>
+    <p:sldId id="265" r:id="rId11"/>
+    <p:sldId id="266" r:id="rId12"/>
+    <p:sldId id="267" r:id="rId13"/>
+    <p:sldId id="268" r:id="rId14"/>
+    <p:sldId id="269" r:id="rId15"/>
+    <p:sldId id="270" r:id="rId16"/>
+    <p:sldId id="271" r:id="rId17"/>
+    <p:sldId id="272" r:id="rId18"/>
+  </p:sldIdLst>
   <p:sldSz cx="9144000" cy="6858000" type="screen4x3"/>
   <p:notesSz cx="6858000" cy="9144000"/>
   <p:defaultTextStyle>
@@ -123,7 +142,7 @@
       </p:grpSpPr>
       <p:sp>
         <p:nvSpPr>
-          <p:cNvPr id="2" name="Заголовок 1"/>
+          <p:cNvPr id="8" name="Заголовок 7"/>
           <p:cNvSpPr>
             <a:spLocks noGrp="1"/>
           </p:cNvSpPr>
@@ -133,25 +152,141 @@
         </p:nvSpPr>
         <p:spPr>
           <a:xfrm>
-            <a:off x="685800" y="2130425"/>
-            <a:ext cx="7772400" cy="1470025"/>
+            <a:off x="422030" y="1371600"/>
+            <a:ext cx="8229600" cy="1828800"/>
           </a:xfrm>
         </p:spPr>
         <p:txBody>
-          <a:bodyPr/>
-          <a:lstStyle/>
-          <a:p>
-            <a:r>
-              <a:rPr lang="ru-RU" smtClean="0"/>
+          <a:bodyPr vert="horz" lIns="45720" tIns="0" rIns="45720" bIns="0" anchor="b">
+            <a:normAutofit/>
+            <a:scene3d>
+              <a:camera prst="orthographicFront"/>
+              <a:lightRig rig="soft" dir="t">
+                <a:rot lat="0" lon="0" rev="17220000"/>
+              </a:lightRig>
+            </a:scene3d>
+            <a:sp3d prstMaterial="softEdge">
+              <a:bevelT w="38100" h="38100"/>
+            </a:sp3d>
+          </a:bodyPr>
+          <a:lstStyle>
+            <a:lvl1pPr>
+              <a:defRPr sz="4800" b="1" cap="all" baseline="0">
+                <a:ln w="6350">
+                  <a:noFill/>
+                </a:ln>
+                <a:gradFill>
+                  <a:gsLst>
+                    <a:gs pos="0">
+                      <a:schemeClr val="accent1">
+                        <a:tint val="73000"/>
+                        <a:satMod val="145000"/>
+                      </a:schemeClr>
+                    </a:gs>
+                    <a:gs pos="73000">
+                      <a:schemeClr val="accent1">
+                        <a:tint val="73000"/>
+                        <a:satMod val="145000"/>
+                      </a:schemeClr>
+                    </a:gs>
+                    <a:gs pos="100000">
+                      <a:schemeClr val="accent1">
+                        <a:tint val="83000"/>
+                        <a:satMod val="143000"/>
+                      </a:schemeClr>
+                    </a:gs>
+                  </a:gsLst>
+                  <a:lin ang="4800000" scaled="1"/>
+                </a:gradFill>
+                <a:effectLst>
+                  <a:outerShdw blurRad="127000" dist="200000" dir="2700000" algn="tl" rotWithShape="0">
+                    <a:srgbClr val="000000">
+                      <a:alpha val="30000"/>
+                    </a:srgbClr>
+                  </a:outerShdw>
+                </a:effectLst>
+              </a:defRPr>
+            </a:lvl1pPr>
+          </a:lstStyle>
+          <a:p>
+            <a:r>
+              <a:rPr kumimoji="0" lang="ru-RU" smtClean="0"/>
               <a:t>Образец заголовка</a:t>
             </a:r>
-            <a:endParaRPr lang="ru-RU"/>
-          </a:p>
-        </p:txBody>
-      </p:sp>
-      <p:sp>
-        <p:nvSpPr>
-          <p:cNvPr id="3" name="Подзаголовок 2"/>
+            <a:endParaRPr kumimoji="0" lang="en-US"/>
+          </a:p>
+        </p:txBody>
+      </p:sp>
+      <p:sp>
+        <p:nvSpPr>
+          <p:cNvPr id="28" name="Дата 27"/>
+          <p:cNvSpPr>
+            <a:spLocks noGrp="1"/>
+          </p:cNvSpPr>
+          <p:nvPr>
+            <p:ph type="dt" sz="half" idx="10"/>
+          </p:nvPr>
+        </p:nvSpPr>
+        <p:spPr/>
+        <p:txBody>
+          <a:bodyPr/>
+          <a:lstStyle/>
+          <a:p>
+            <a:fld id="{5B106E36-FD25-4E2D-B0AA-010F637433A0}" type="datetimeFigureOut">
+              <a:rPr lang="ru-RU" smtClean="0"/>
+              <a:pPr/>
+              <a:t>06.10.2019</a:t>
+            </a:fld>
+            <a:endParaRPr lang="ru-RU"/>
+          </a:p>
+        </p:txBody>
+      </p:sp>
+      <p:sp>
+        <p:nvSpPr>
+          <p:cNvPr id="17" name="Нижний колонтитул 16"/>
+          <p:cNvSpPr>
+            <a:spLocks noGrp="1"/>
+          </p:cNvSpPr>
+          <p:nvPr>
+            <p:ph type="ftr" sz="quarter" idx="11"/>
+          </p:nvPr>
+        </p:nvSpPr>
+        <p:spPr/>
+        <p:txBody>
+          <a:bodyPr/>
+          <a:lstStyle/>
+          <a:p>
+            <a:endParaRPr lang="ru-RU"/>
+          </a:p>
+        </p:txBody>
+      </p:sp>
+      <p:sp>
+        <p:nvSpPr>
+          <p:cNvPr id="29" name="Номер слайда 28"/>
+          <p:cNvSpPr>
+            <a:spLocks noGrp="1"/>
+          </p:cNvSpPr>
+          <p:nvPr>
+            <p:ph type="sldNum" sz="quarter" idx="12"/>
+          </p:nvPr>
+        </p:nvSpPr>
+        <p:spPr/>
+        <p:txBody>
+          <a:bodyPr/>
+          <a:lstStyle/>
+          <a:p>
+            <a:fld id="{725C68B6-61C2-468F-89AB-4B9F7531AA68}" type="slidenum">
+              <a:rPr lang="ru-RU" smtClean="0"/>
+              <a:pPr/>
+              <a:t>‹#›</a:t>
+            </a:fld>
+            <a:endParaRPr lang="ru-RU"/>
+          </a:p>
+        </p:txBody>
+      </p:sp>
+      <p:sp>
+        <p:nvSpPr>
+          <p:cNvPr id="9" name="Подзаголовок 8"/>
           <p:cNvSpPr>
             <a:spLocks noGrp="1"/>
           </p:cNvSpPr>
@@ -161,7 +296,7 @@
         </p:nvSpPr>
         <p:spPr>
           <a:xfrm>
-            <a:off x="1371600" y="3886200"/>
+            <a:off x="1371600" y="3331698"/>
             <a:ext cx="6400800" cy="1752600"/>
           </a:xfrm>
         </p:spPr>
@@ -172,164 +307,41 @@
               <a:buNone/>
               <a:defRPr>
                 <a:solidFill>
-                  <a:schemeClr val="tx1">
-                    <a:tint val="75000"/>
-                  </a:schemeClr>
+                  <a:schemeClr val="tx1"/>
                 </a:solidFill>
               </a:defRPr>
             </a:lvl1pPr>
             <a:lvl2pPr marL="457200" indent="0" algn="ctr">
               <a:buNone/>
-              <a:defRPr>
-                <a:solidFill>
-                  <a:schemeClr val="tx1">
-                    <a:tint val="75000"/>
-                  </a:schemeClr>
-                </a:solidFill>
-              </a:defRPr>
             </a:lvl2pPr>
             <a:lvl3pPr marL="914400" indent="0" algn="ctr">
               <a:buNone/>
-              <a:defRPr>
-                <a:solidFill>
-                  <a:schemeClr val="tx1">
-                    <a:tint val="75000"/>
-                  </a:schemeClr>
-                </a:solidFill>
-              </a:defRPr>
             </a:lvl3pPr>
             <a:lvl4pPr marL="1371600" indent="0" algn="ctr">
               <a:buNone/>
-              <a:defRPr>
-                <a:solidFill>
-                  <a:schemeClr val="tx1">
-                    <a:tint val="75000"/>
-                  </a:schemeClr>
-                </a:solidFill>
-              </a:defRPr>
             </a:lvl4pPr>
             <a:lvl5pPr marL="1828800" indent="0" algn="ctr">
               <a:buNone/>
-              <a:defRPr>
-                <a:solidFill>
-                  <a:schemeClr val="tx1">
-                    <a:tint val="75000"/>
-                  </a:schemeClr>
-                </a:solidFill>
-              </a:defRPr>
             </a:lvl5pPr>
             <a:lvl6pPr marL="2286000" indent="0" algn="ctr">
               <a:buNone/>
-              <a:defRPr>
-                <a:solidFill>
-                  <a:schemeClr val="tx1">
-                    <a:tint val="75000"/>
-                  </a:schemeClr>
-                </a:solidFill>
-              </a:defRPr>
             </a:lvl6pPr>
             <a:lvl7pPr marL="2743200" indent="0" algn="ctr">
               <a:buNone/>
-              <a:defRPr>
-                <a:solidFill>
-                  <a:schemeClr val="tx1">
-                    <a:tint val="75000"/>
-                  </a:schemeClr>
-                </a:solidFill>
-              </a:defRPr>
             </a:lvl7pPr>
             <a:lvl8pPr marL="3200400" indent="0" algn="ctr">
               <a:buNone/>
-              <a:defRPr>
-                <a:solidFill>
-                  <a:schemeClr val="tx1">
-                    <a:tint val="75000"/>
-                  </a:schemeClr>
-                </a:solidFill>
-              </a:defRPr>
             </a:lvl8pPr>
             <a:lvl9pPr marL="3657600" indent="0" algn="ctr">
               <a:buNone/>
-              <a:defRPr>
-                <a:solidFill>
-                  <a:schemeClr val="tx1">
-                    <a:tint val="75000"/>
-                  </a:schemeClr>
-                </a:solidFill>
-              </a:defRPr>
             </a:lvl9pPr>
           </a:lstStyle>
           <a:p>
             <a:r>
-              <a:rPr lang="ru-RU" smtClean="0"/>
+              <a:rPr kumimoji="0" lang="ru-RU" smtClean="0"/>
               <a:t>Образец подзаголовка</a:t>
             </a:r>
-            <a:endParaRPr lang="ru-RU"/>
-          </a:p>
-        </p:txBody>
-      </p:sp>
-      <p:sp>
-        <p:nvSpPr>
-          <p:cNvPr id="4" name="Дата 3"/>
-          <p:cNvSpPr>
-            <a:spLocks noGrp="1"/>
-          </p:cNvSpPr>
-          <p:nvPr>
-            <p:ph type="dt" sz="half" idx="10"/>
-          </p:nvPr>
-        </p:nvSpPr>
-        <p:spPr/>
-        <p:txBody>
-          <a:bodyPr/>
-          <a:lstStyle/>
-          <a:p>
-            <a:fld id="{5B106E36-FD25-4E2D-B0AA-010F637433A0}" type="datetimeFigureOut">
-              <a:rPr lang="ru-RU" smtClean="0"/>
-              <a:t>03.11.2006</a:t>
-            </a:fld>
-            <a:endParaRPr lang="ru-RU"/>
-          </a:p>
-        </p:txBody>
-      </p:sp>
-      <p:sp>
-        <p:nvSpPr>
-          <p:cNvPr id="5" name="Нижний колонтитул 4"/>
-          <p:cNvSpPr>
-            <a:spLocks noGrp="1"/>
-          </p:cNvSpPr>
-          <p:nvPr>
-            <p:ph type="ftr" sz="quarter" idx="11"/>
-          </p:nvPr>
-        </p:nvSpPr>
-        <p:spPr/>
-        <p:txBody>
-          <a:bodyPr/>
-          <a:lstStyle/>
-          <a:p>
-            <a:endParaRPr lang="ru-RU"/>
-          </a:p>
-        </p:txBody>
-      </p:sp>
-      <p:sp>
-        <p:nvSpPr>
-          <p:cNvPr id="6" name="Номер слайда 5"/>
-          <p:cNvSpPr>
-            <a:spLocks noGrp="1"/>
-          </p:cNvSpPr>
-          <p:nvPr>
-            <p:ph type="sldNum" sz="quarter" idx="12"/>
-          </p:nvPr>
-        </p:nvSpPr>
-        <p:spPr/>
-        <p:txBody>
-          <a:bodyPr/>
-          <a:lstStyle/>
-          <a:p>
-            <a:fld id="{725C68B6-61C2-468F-89AB-4B9F7531AA68}" type="slidenum">
-              <a:rPr lang="ru-RU" smtClean="0"/>
-              <a:t>‹#›</a:t>
-            </a:fld>
-            <a:endParaRPr lang="ru-RU"/>
+            <a:endParaRPr kumimoji="0" lang="en-US"/>
           </a:p>
         </p:txBody>
       </p:sp>
@@ -374,10 +386,10 @@
           <a:lstStyle/>
           <a:p>
             <a:r>
-              <a:rPr lang="ru-RU" smtClean="0"/>
+              <a:rPr kumimoji="0" lang="ru-RU" smtClean="0"/>
               <a:t>Образец заголовка</a:t>
             </a:r>
-            <a:endParaRPr lang="ru-RU"/>
+            <a:endParaRPr kumimoji="0" lang="en-US"/>
           </a:p>
         </p:txBody>
       </p:sp>
@@ -396,40 +408,40 @@
           <a:bodyPr vert="eaVert"/>
           <a:lstStyle/>
           <a:p>
-            <a:pPr lvl="0"/>
+            <a:pPr lvl="0" eaLnBrk="1" latinLnBrk="0" hangingPunct="1"/>
             <a:r>
               <a:rPr lang="ru-RU" smtClean="0"/>
               <a:t>Образец текста</a:t>
             </a:r>
           </a:p>
           <a:p>
-            <a:pPr lvl="1"/>
+            <a:pPr lvl="1" eaLnBrk="1" latinLnBrk="0" hangingPunct="1"/>
             <a:r>
               <a:rPr lang="ru-RU" smtClean="0"/>
               <a:t>Второй уровень</a:t>
             </a:r>
           </a:p>
           <a:p>
-            <a:pPr lvl="2"/>
+            <a:pPr lvl="2" eaLnBrk="1" latinLnBrk="0" hangingPunct="1"/>
             <a:r>
               <a:rPr lang="ru-RU" smtClean="0"/>
               <a:t>Третий уровень</a:t>
             </a:r>
           </a:p>
           <a:p>
-            <a:pPr lvl="3"/>
+            <a:pPr lvl="3" eaLnBrk="1" latinLnBrk="0" hangingPunct="1"/>
             <a:r>
               <a:rPr lang="ru-RU" smtClean="0"/>
               <a:t>Четвертый уровень</a:t>
             </a:r>
           </a:p>
           <a:p>
-            <a:pPr lvl="4"/>
+            <a:pPr lvl="4" eaLnBrk="1" latinLnBrk="0" hangingPunct="1"/>
             <a:r>
               <a:rPr lang="ru-RU" smtClean="0"/>
               <a:t>Пятый уровень</a:t>
             </a:r>
-            <a:endParaRPr lang="ru-RU"/>
+            <a:endParaRPr kumimoji="0" lang="en-US"/>
           </a:p>
         </p:txBody>
       </p:sp>
@@ -450,7 +462,8 @@
           <a:p>
             <a:fld id="{5B106E36-FD25-4E2D-B0AA-010F637433A0}" type="datetimeFigureOut">
               <a:rPr lang="ru-RU" smtClean="0"/>
-              <a:t>03.11.2006</a:t>
+              <a:pPr/>
+              <a:t>06.10.2019</a:t>
             </a:fld>
             <a:endParaRPr lang="ru-RU"/>
           </a:p>
@@ -492,6 +505,7 @@
           <a:p>
             <a:fld id="{725C68B6-61C2-468F-89AB-4B9F7531AA68}" type="slidenum">
               <a:rPr lang="ru-RU" smtClean="0"/>
+              <a:pPr/>
               <a:t>‹#›</a:t>
             </a:fld>
             <a:endParaRPr lang="ru-RU"/>
@@ -544,10 +558,10 @@
           <a:lstStyle/>
           <a:p>
             <a:r>
-              <a:rPr lang="ru-RU" smtClean="0"/>
+              <a:rPr kumimoji="0" lang="ru-RU" smtClean="0"/>
               <a:t>Образец заголовка</a:t>
             </a:r>
-            <a:endParaRPr lang="ru-RU"/>
+            <a:endParaRPr kumimoji="0" lang="en-US"/>
           </a:p>
         </p:txBody>
       </p:sp>
@@ -571,40 +585,40 @@
           <a:bodyPr vert="eaVert"/>
           <a:lstStyle/>
           <a:p>
-            <a:pPr lvl="0"/>
+            <a:pPr lvl="0" eaLnBrk="1" latinLnBrk="0" hangingPunct="1"/>
             <a:r>
               <a:rPr lang="ru-RU" smtClean="0"/>
               <a:t>Образец текста</a:t>
             </a:r>
           </a:p>
           <a:p>
-            <a:pPr lvl="1"/>
+            <a:pPr lvl="1" eaLnBrk="1" latinLnBrk="0" hangingPunct="1"/>
             <a:r>
               <a:rPr lang="ru-RU" smtClean="0"/>
               <a:t>Второй уровень</a:t>
             </a:r>
           </a:p>
           <a:p>
-            <a:pPr lvl="2"/>
+            <a:pPr lvl="2" eaLnBrk="1" latinLnBrk="0" hangingPunct="1"/>
             <a:r>
               <a:rPr lang="ru-RU" smtClean="0"/>
               <a:t>Третий уровень</a:t>
             </a:r>
           </a:p>
           <a:p>
-            <a:pPr lvl="3"/>
+            <a:pPr lvl="3" eaLnBrk="1" latinLnBrk="0" hangingPunct="1"/>
             <a:r>
               <a:rPr lang="ru-RU" smtClean="0"/>
               <a:t>Четвертый уровень</a:t>
             </a:r>
           </a:p>
           <a:p>
-            <a:pPr lvl="4"/>
+            <a:pPr lvl="4" eaLnBrk="1" latinLnBrk="0" hangingPunct="1"/>
             <a:r>
               <a:rPr lang="ru-RU" smtClean="0"/>
               <a:t>Пятый уровень</a:t>
             </a:r>
-            <a:endParaRPr lang="ru-RU"/>
+            <a:endParaRPr kumimoji="0" lang="en-US"/>
           </a:p>
         </p:txBody>
       </p:sp>
@@ -625,7 +639,8 @@
           <a:p>
             <a:fld id="{5B106E36-FD25-4E2D-B0AA-010F637433A0}" type="datetimeFigureOut">
               <a:rPr lang="ru-RU" smtClean="0"/>
-              <a:t>03.11.2006</a:t>
+              <a:pPr/>
+              <a:t>06.10.2019</a:t>
             </a:fld>
             <a:endParaRPr lang="ru-RU"/>
           </a:p>
@@ -667,6 +682,7 @@
           <a:p>
             <a:fld id="{725C68B6-61C2-468F-89AB-4B9F7531AA68}" type="slidenum">
               <a:rPr lang="ru-RU" smtClean="0"/>
+              <a:pPr/>
               <a:t>‹#›</a:t>
             </a:fld>
             <a:endParaRPr lang="ru-RU"/>
@@ -714,10 +730,10 @@
           <a:lstStyle/>
           <a:p>
             <a:r>
-              <a:rPr lang="ru-RU" smtClean="0"/>
+              <a:rPr kumimoji="0" lang="ru-RU" smtClean="0"/>
               <a:t>Образец заголовка</a:t>
             </a:r>
-            <a:endParaRPr lang="ru-RU"/>
+            <a:endParaRPr kumimoji="0" lang="en-US"/>
           </a:p>
         </p:txBody>
       </p:sp>
@@ -736,40 +752,40 @@
           <a:bodyPr/>
           <a:lstStyle/>
           <a:p>
-            <a:pPr lvl="0"/>
+            <a:pPr lvl="0" eaLnBrk="1" latinLnBrk="0" hangingPunct="1"/>
             <a:r>
               <a:rPr lang="ru-RU" smtClean="0"/>
               <a:t>Образец текста</a:t>
             </a:r>
           </a:p>
           <a:p>
-            <a:pPr lvl="1"/>
+            <a:pPr lvl="1" eaLnBrk="1" latinLnBrk="0" hangingPunct="1"/>
             <a:r>
               <a:rPr lang="ru-RU" smtClean="0"/>
               <a:t>Второй уровень</a:t>
             </a:r>
           </a:p>
           <a:p>
-            <a:pPr lvl="2"/>
+            <a:pPr lvl="2" eaLnBrk="1" latinLnBrk="0" hangingPunct="1"/>
             <a:r>
               <a:rPr lang="ru-RU" smtClean="0"/>
               <a:t>Третий уровень</a:t>
             </a:r>
           </a:p>
           <a:p>
-            <a:pPr lvl="3"/>
+            <a:pPr lvl="3" eaLnBrk="1" latinLnBrk="0" hangingPunct="1"/>
             <a:r>
               <a:rPr lang="ru-RU" smtClean="0"/>
               <a:t>Четвертый уровень</a:t>
             </a:r>
           </a:p>
           <a:p>
-            <a:pPr lvl="4"/>
+            <a:pPr lvl="4" eaLnBrk="1" latinLnBrk="0" hangingPunct="1"/>
             <a:r>
               <a:rPr lang="ru-RU" smtClean="0"/>
               <a:t>Пятый уровень</a:t>
             </a:r>
-            <a:endParaRPr lang="ru-RU"/>
+            <a:endParaRPr kumimoji="0" lang="en-US"/>
           </a:p>
         </p:txBody>
       </p:sp>
@@ -790,7 +806,8 @@
           <a:p>
             <a:fld id="{5B106E36-FD25-4E2D-B0AA-010F637433A0}" type="datetimeFigureOut">
               <a:rPr lang="ru-RU" smtClean="0"/>
-              <a:t>03.11.2006</a:t>
+              <a:pPr/>
+              <a:t>06.10.2019</a:t>
             </a:fld>
             <a:endParaRPr lang="ru-RU"/>
           </a:p>
@@ -832,6 +849,7 @@
           <a:p>
             <a:fld id="{725C68B6-61C2-468F-89AB-4B9F7531AA68}" type="slidenum">
               <a:rPr lang="ru-RU" smtClean="0"/>
+              <a:pPr/>
               <a:t>‹#›</a:t>
             </a:fld>
             <a:endParaRPr lang="ru-RU"/>
@@ -849,6 +867,11 @@
 <file path=ppt/slideLayouts/slideLayout3.xml><?xml version="1.0" encoding="utf-8"?>
 <p:sldLayout xmlns:a="http://schemas.openxmlformats.org/drawingml/2006/main" xmlns:r="http://schemas.openxmlformats.org/officeDocument/2006/relationships" xmlns:p="http://schemas.openxmlformats.org/presentationml/2006/main" type="secHead" preserve="1">
   <p:cSld name="Заголовок раздела">
+    <p:bg>
+      <p:bgRef idx="1003">
+        <a:schemeClr val="bg2"/>
+      </p:bgRef>
+    </p:bg>
     <p:spTree>
       <p:nvGrpSpPr>
         <p:cNvPr id="1" name=""/>
@@ -875,56 +898,94 @@
         </p:nvSpPr>
         <p:spPr>
           <a:xfrm>
-            <a:off x="722313" y="4406900"/>
-            <a:ext cx="7772400" cy="1362075"/>
+            <a:off x="1600200" y="609600"/>
+            <a:ext cx="7086600" cy="1828800"/>
           </a:xfrm>
         </p:spPr>
         <p:txBody>
+          <a:bodyPr vert="horz" bIns="0" anchor="b">
+            <a:noAutofit/>
+            <a:scene3d>
+              <a:camera prst="orthographicFront"/>
+              <a:lightRig rig="soft" dir="t">
+                <a:rot lat="0" lon="0" rev="17220000"/>
+              </a:lightRig>
+            </a:scene3d>
+            <a:sp3d prstMaterial="softEdge">
+              <a:bevelT w="38100" h="38100"/>
+              <a:contourClr>
+                <a:schemeClr val="tx2">
+                  <a:shade val="50000"/>
+                </a:schemeClr>
+              </a:contourClr>
+            </a:sp3d>
+          </a:bodyPr>
+          <a:lstStyle>
+            <a:lvl1pPr algn="l" rtl="0">
+              <a:spcBef>
+                <a:spcPct val="0"/>
+              </a:spcBef>
+              <a:buNone/>
+              <a:defRPr sz="4800" b="1" cap="none" baseline="0">
+                <a:ln w="6350">
+                  <a:noFill/>
+                </a:ln>
+                <a:solidFill>
+                  <a:schemeClr val="accent1">
+                    <a:tint val="90000"/>
+                    <a:satMod val="120000"/>
+                  </a:schemeClr>
+                </a:solidFill>
+                <a:effectLst>
+                  <a:outerShdw blurRad="114300" dist="101600" dir="2700000" algn="tl" rotWithShape="0">
+                    <a:srgbClr val="000000">
+                      <a:alpha val="40000"/>
+                    </a:srgbClr>
+                  </a:outerShdw>
+                </a:effectLst>
+                <a:latin typeface="+mj-lt"/>
+                <a:ea typeface="+mj-ea"/>
+                <a:cs typeface="+mj-cs"/>
+              </a:defRPr>
+            </a:lvl1pPr>
+          </a:lstStyle>
+          <a:p>
+            <a:r>
+              <a:rPr kumimoji="0" lang="ru-RU" smtClean="0"/>
+              <a:t>Образец заголовка</a:t>
+            </a:r>
+            <a:endParaRPr kumimoji="0" lang="en-US"/>
+          </a:p>
+        </p:txBody>
+      </p:sp>
+      <p:sp>
+        <p:nvSpPr>
+          <p:cNvPr id="3" name="Текст 2"/>
+          <p:cNvSpPr>
+            <a:spLocks noGrp="1"/>
+          </p:cNvSpPr>
+          <p:nvPr>
+            <p:ph type="body" idx="1"/>
+          </p:nvPr>
+        </p:nvSpPr>
+        <p:spPr>
+          <a:xfrm>
+            <a:off x="1600200" y="2507786"/>
+            <a:ext cx="7086600" cy="1509712"/>
+          </a:xfrm>
+        </p:spPr>
+        <p:txBody>
           <a:bodyPr anchor="t"/>
           <a:lstStyle>
-            <a:lvl1pPr algn="l">
-              <a:defRPr sz="4000" b="1" cap="all"/>
-            </a:lvl1pPr>
-          </a:lstStyle>
-          <a:p>
-            <a:r>
-              <a:rPr lang="ru-RU" smtClean="0"/>
-              <a:t>Образец заголовка</a:t>
-            </a:r>
-            <a:endParaRPr lang="ru-RU"/>
-          </a:p>
-        </p:txBody>
-      </p:sp>
-      <p:sp>
-        <p:nvSpPr>
-          <p:cNvPr id="3" name="Текст 2"/>
-          <p:cNvSpPr>
-            <a:spLocks noGrp="1"/>
-          </p:cNvSpPr>
-          <p:nvPr>
-            <p:ph type="body" idx="1"/>
-          </p:nvPr>
-        </p:nvSpPr>
-        <p:spPr>
-          <a:xfrm>
-            <a:off x="722313" y="2906713"/>
-            <a:ext cx="7772400" cy="1500187"/>
-          </a:xfrm>
-        </p:spPr>
-        <p:txBody>
-          <a:bodyPr anchor="b"/>
-          <a:lstStyle>
-            <a:lvl1pPr marL="0" indent="0">
+            <a:lvl1pPr marL="73152" indent="0" algn="l">
               <a:buNone/>
               <a:defRPr sz="2000">
                 <a:solidFill>
-                  <a:schemeClr val="tx1">
-                    <a:tint val="75000"/>
-                  </a:schemeClr>
+                  <a:schemeClr val="tx1"/>
                 </a:solidFill>
               </a:defRPr>
             </a:lvl1pPr>
-            <a:lvl2pPr marL="457200" indent="0">
+            <a:lvl2pPr>
               <a:buNone/>
               <a:defRPr sz="1800">
                 <a:solidFill>
@@ -934,7 +995,7 @@
                 </a:solidFill>
               </a:defRPr>
             </a:lvl2pPr>
-            <a:lvl3pPr marL="914400" indent="0">
+            <a:lvl3pPr>
               <a:buNone/>
               <a:defRPr sz="1600">
                 <a:solidFill>
@@ -944,7 +1005,7 @@
                 </a:solidFill>
               </a:defRPr>
             </a:lvl3pPr>
-            <a:lvl4pPr marL="1371600" indent="0">
+            <a:lvl4pPr>
               <a:buNone/>
               <a:defRPr sz="1400">
                 <a:solidFill>
@@ -954,7 +1015,7 @@
                 </a:solidFill>
               </a:defRPr>
             </a:lvl4pPr>
-            <a:lvl5pPr marL="1828800" indent="0">
+            <a:lvl5pPr>
               <a:buNone/>
               <a:defRPr sz="1400">
                 <a:solidFill>
@@ -964,51 +1025,11 @@
                 </a:solidFill>
               </a:defRPr>
             </a:lvl5pPr>
-            <a:lvl6pPr marL="2286000" indent="0">
-              <a:buNone/>
-              <a:defRPr sz="1400">
-                <a:solidFill>
-                  <a:schemeClr val="tx1">
-                    <a:tint val="75000"/>
-                  </a:schemeClr>
-                </a:solidFill>
-              </a:defRPr>
-            </a:lvl6pPr>
-            <a:lvl7pPr marL="2743200" indent="0">
-              <a:buNone/>
-              <a:defRPr sz="1400">
-                <a:solidFill>
-                  <a:schemeClr val="tx1">
-                    <a:tint val="75000"/>
-                  </a:schemeClr>
-                </a:solidFill>
-              </a:defRPr>
-            </a:lvl7pPr>
-            <a:lvl8pPr marL="3200400" indent="0">
-              <a:buNone/>
-              <a:defRPr sz="1400">
-                <a:solidFill>
-                  <a:schemeClr val="tx1">
-                    <a:tint val="75000"/>
-                  </a:schemeClr>
-                </a:solidFill>
-              </a:defRPr>
-            </a:lvl8pPr>
-            <a:lvl9pPr marL="3657600" indent="0">
-              <a:buNone/>
-              <a:defRPr sz="1400">
-                <a:solidFill>
-                  <a:schemeClr val="tx1">
-                    <a:tint val="75000"/>
-                  </a:schemeClr>
-                </a:solidFill>
-              </a:defRPr>
-            </a:lvl9pPr>
           </a:lstStyle>
           <a:p>
-            <a:pPr lvl="0"/>
-            <a:r>
-              <a:rPr lang="ru-RU" smtClean="0"/>
+            <a:pPr lvl="0" eaLnBrk="1" latinLnBrk="0" hangingPunct="1"/>
+            <a:r>
+              <a:rPr kumimoji="0" lang="ru-RU" smtClean="0"/>
               <a:t>Образец текста</a:t>
             </a:r>
           </a:p>
@@ -1031,7 +1052,8 @@
           <a:p>
             <a:fld id="{5B106E36-FD25-4E2D-B0AA-010F637433A0}" type="datetimeFigureOut">
               <a:rPr lang="ru-RU" smtClean="0"/>
-              <a:t>03.11.2006</a:t>
+              <a:pPr/>
+              <a:t>06.10.2019</a:t>
             </a:fld>
             <a:endParaRPr lang="ru-RU"/>
           </a:p>
@@ -1066,13 +1088,19 @@
             <p:ph type="sldNum" sz="quarter" idx="12"/>
           </p:nvPr>
         </p:nvSpPr>
-        <p:spPr/>
+        <p:spPr>
+          <a:xfrm>
+            <a:off x="7924800" y="6416675"/>
+            <a:ext cx="762000" cy="365125"/>
+          </a:xfrm>
+        </p:spPr>
         <p:txBody>
           <a:bodyPr/>
           <a:lstStyle/>
           <a:p>
             <a:fld id="{725C68B6-61C2-468F-89AB-4B9F7531AA68}" type="slidenum">
               <a:rPr lang="ru-RU" smtClean="0"/>
+              <a:pPr/>
               <a:t>‹#›</a:t>
             </a:fld>
             <a:endParaRPr lang="ru-RU"/>
@@ -1082,7 +1110,7 @@
     </p:spTree>
   </p:cSld>
   <p:clrMapOvr>
-    <a:masterClrMapping/>
+    <a:overrideClrMapping bg1="dk1" tx1="lt1" bg2="dk2" tx2="lt2" accent1="accent1" accent2="accent2" accent3="accent3" accent4="accent4" accent5="accent5" accent6="accent6" hlink="hlink" folHlink="folHlink"/>
   </p:clrMapOvr>
 </p:sldLayout>
 </file>
@@ -1120,10 +1148,10 @@
           <a:lstStyle/>
           <a:p>
             <a:r>
-              <a:rPr lang="ru-RU" smtClean="0"/>
+              <a:rPr kumimoji="0" lang="ru-RU" smtClean="0"/>
               <a:t>Образец заголовка</a:t>
             </a:r>
-            <a:endParaRPr lang="ru-RU"/>
+            <a:endParaRPr kumimoji="0" lang="en-US"/>
           </a:p>
         </p:txBody>
       </p:sp>
@@ -1147,7 +1175,7 @@
           <a:bodyPr/>
           <a:lstStyle>
             <a:lvl1pPr>
-              <a:defRPr sz="2800"/>
+              <a:defRPr sz="2600"/>
             </a:lvl1pPr>
             <a:lvl2pPr>
               <a:defRPr sz="2400"/>
@@ -1161,54 +1189,42 @@
             <a:lvl5pPr>
               <a:defRPr sz="1800"/>
             </a:lvl5pPr>
-            <a:lvl6pPr>
-              <a:defRPr sz="1800"/>
-            </a:lvl6pPr>
-            <a:lvl7pPr>
-              <a:defRPr sz="1800"/>
-            </a:lvl7pPr>
-            <a:lvl8pPr>
-              <a:defRPr sz="1800"/>
-            </a:lvl8pPr>
-            <a:lvl9pPr>
-              <a:defRPr sz="1800"/>
-            </a:lvl9pPr>
           </a:lstStyle>
           <a:p>
-            <a:pPr lvl="0"/>
+            <a:pPr lvl="0" eaLnBrk="1" latinLnBrk="0" hangingPunct="1"/>
             <a:r>
               <a:rPr lang="ru-RU" smtClean="0"/>
               <a:t>Образец текста</a:t>
             </a:r>
           </a:p>
           <a:p>
-            <a:pPr lvl="1"/>
+            <a:pPr lvl="1" eaLnBrk="1" latinLnBrk="0" hangingPunct="1"/>
             <a:r>
               <a:rPr lang="ru-RU" smtClean="0"/>
               <a:t>Второй уровень</a:t>
             </a:r>
           </a:p>
           <a:p>
-            <a:pPr lvl="2"/>
+            <a:pPr lvl="2" eaLnBrk="1" latinLnBrk="0" hangingPunct="1"/>
             <a:r>
               <a:rPr lang="ru-RU" smtClean="0"/>
               <a:t>Третий уровень</a:t>
             </a:r>
           </a:p>
           <a:p>
-            <a:pPr lvl="3"/>
+            <a:pPr lvl="3" eaLnBrk="1" latinLnBrk="0" hangingPunct="1"/>
             <a:r>
               <a:rPr lang="ru-RU" smtClean="0"/>
               <a:t>Четвертый уровень</a:t>
             </a:r>
           </a:p>
           <a:p>
-            <a:pPr lvl="4"/>
+            <a:pPr lvl="4" eaLnBrk="1" latinLnBrk="0" hangingPunct="1"/>
             <a:r>
               <a:rPr lang="ru-RU" smtClean="0"/>
               <a:t>Пятый уровень</a:t>
             </a:r>
-            <a:endParaRPr lang="ru-RU"/>
+            <a:endParaRPr kumimoji="0" lang="en-US"/>
           </a:p>
         </p:txBody>
       </p:sp>
@@ -1232,7 +1248,7 @@
           <a:bodyPr/>
           <a:lstStyle>
             <a:lvl1pPr>
-              <a:defRPr sz="2800"/>
+              <a:defRPr sz="2600"/>
             </a:lvl1pPr>
             <a:lvl2pPr>
               <a:defRPr sz="2400"/>
@@ -1246,54 +1262,42 @@
             <a:lvl5pPr>
               <a:defRPr sz="1800"/>
             </a:lvl5pPr>
-            <a:lvl6pPr>
-              <a:defRPr sz="1800"/>
-            </a:lvl6pPr>
-            <a:lvl7pPr>
-              <a:defRPr sz="1800"/>
-            </a:lvl7pPr>
-            <a:lvl8pPr>
-              <a:defRPr sz="1800"/>
-            </a:lvl8pPr>
-            <a:lvl9pPr>
-              <a:defRPr sz="1800"/>
-            </a:lvl9pPr>
           </a:lstStyle>
           <a:p>
-            <a:pPr lvl="0"/>
+            <a:pPr lvl="0" eaLnBrk="1" latinLnBrk="0" hangingPunct="1"/>
             <a:r>
               <a:rPr lang="ru-RU" smtClean="0"/>
               <a:t>Образец текста</a:t>
             </a:r>
           </a:p>
           <a:p>
-            <a:pPr lvl="1"/>
+            <a:pPr lvl="1" eaLnBrk="1" latinLnBrk="0" hangingPunct="1"/>
             <a:r>
               <a:rPr lang="ru-RU" smtClean="0"/>
               <a:t>Второй уровень</a:t>
             </a:r>
           </a:p>
           <a:p>
-            <a:pPr lvl="2"/>
+            <a:pPr lvl="2" eaLnBrk="1" latinLnBrk="0" hangingPunct="1"/>
             <a:r>
               <a:rPr lang="ru-RU" smtClean="0"/>
               <a:t>Третий уровень</a:t>
             </a:r>
           </a:p>
           <a:p>
-            <a:pPr lvl="3"/>
+            <a:pPr lvl="3" eaLnBrk="1" latinLnBrk="0" hangingPunct="1"/>
             <a:r>
               <a:rPr lang="ru-RU" smtClean="0"/>
               <a:t>Четвертый уровень</a:t>
             </a:r>
           </a:p>
           <a:p>
-            <a:pPr lvl="4"/>
+            <a:pPr lvl="4" eaLnBrk="1" latinLnBrk="0" hangingPunct="1"/>
             <a:r>
               <a:rPr lang="ru-RU" smtClean="0"/>
               <a:t>Пятый уровень</a:t>
             </a:r>
-            <a:endParaRPr lang="ru-RU"/>
+            <a:endParaRPr kumimoji="0" lang="en-US"/>
           </a:p>
         </p:txBody>
       </p:sp>
@@ -1314,7 +1318,8 @@
           <a:p>
             <a:fld id="{5B106E36-FD25-4E2D-B0AA-010F637433A0}" type="datetimeFigureOut">
               <a:rPr lang="ru-RU" smtClean="0"/>
-              <a:t>03.11.2006</a:t>
+              <a:pPr/>
+              <a:t>06.10.2019</a:t>
             </a:fld>
             <a:endParaRPr lang="ru-RU"/>
           </a:p>
@@ -1356,6 +1361,7 @@
           <a:p>
             <a:fld id="{725C68B6-61C2-468F-89AB-4B9F7531AA68}" type="slidenum">
               <a:rPr lang="ru-RU" smtClean="0"/>
+              <a:pPr/>
               <a:t>‹#›</a:t>
             </a:fld>
             <a:endParaRPr lang="ru-RU"/>
@@ -1397,9 +1403,14 @@
             <p:ph type="title"/>
           </p:nvPr>
         </p:nvSpPr>
-        <p:spPr/>
-        <p:txBody>
-          <a:bodyPr/>
+        <p:spPr>
+          <a:xfrm>
+            <a:off x="457200" y="273050"/>
+            <a:ext cx="8229600" cy="1143000"/>
+          </a:xfrm>
+        </p:spPr>
+        <p:txBody>
+          <a:bodyPr anchor="ctr"/>
           <a:lstStyle>
             <a:lvl1pPr>
               <a:defRPr/>
@@ -1407,10 +1418,10 @@
           </a:lstStyle>
           <a:p>
             <a:r>
-              <a:rPr lang="ru-RU" smtClean="0"/>
+              <a:rPr kumimoji="0" lang="ru-RU" smtClean="0"/>
               <a:t>Образец заголовка</a:t>
             </a:r>
-            <a:endParaRPr lang="ru-RU"/>
+            <a:endParaRPr kumimoji="0" lang="en-US"/>
           </a:p>
         </p:txBody>
       </p:sp>
@@ -1426,54 +1437,95 @@
         </p:nvSpPr>
         <p:spPr>
           <a:xfrm>
-            <a:off x="457200" y="1535113"/>
-            <a:ext cx="4040188" cy="639762"/>
+            <a:off x="457200" y="1535112"/>
+            <a:ext cx="4040188" cy="750887"/>
           </a:xfrm>
         </p:spPr>
         <p:txBody>
-          <a:bodyPr anchor="b"/>
+          <a:bodyPr anchor="ctr"/>
           <a:lstStyle>
             <a:lvl1pPr marL="0" indent="0">
               <a:buNone/>
-              <a:defRPr sz="2400" b="1"/>
+              <a:defRPr sz="2400" b="0" cap="all" baseline="0">
+                <a:solidFill>
+                  <a:schemeClr val="tx1"/>
+                </a:solidFill>
+              </a:defRPr>
             </a:lvl1pPr>
-            <a:lvl2pPr marL="457200" indent="0">
+            <a:lvl2pPr>
               <a:buNone/>
               <a:defRPr sz="2000" b="1"/>
             </a:lvl2pPr>
-            <a:lvl3pPr marL="914400" indent="0">
+            <a:lvl3pPr>
               <a:buNone/>
               <a:defRPr sz="1800" b="1"/>
             </a:lvl3pPr>
-            <a:lvl4pPr marL="1371600" indent="0">
+            <a:lvl4pPr>
               <a:buNone/>
               <a:defRPr sz="1600" b="1"/>
             </a:lvl4pPr>
-            <a:lvl5pPr marL="1828800" indent="0">
+            <a:lvl5pPr>
               <a:buNone/>
               <a:defRPr sz="1600" b="1"/>
             </a:lvl5pPr>
-            <a:lvl6pPr marL="2286000" indent="0">
+          </a:lstStyle>
+          <a:p>
+            <a:pPr lvl="0" eaLnBrk="1" latinLnBrk="0" hangingPunct="1"/>
+            <a:r>
+              <a:rPr kumimoji="0" lang="ru-RU" smtClean="0"/>
+              <a:t>Образец текста</a:t>
+            </a:r>
+          </a:p>
+        </p:txBody>
+      </p:sp>
+      <p:sp>
+        <p:nvSpPr>
+          <p:cNvPr id="4" name="Текст 3"/>
+          <p:cNvSpPr>
+            <a:spLocks noGrp="1"/>
+          </p:cNvSpPr>
+          <p:nvPr>
+            <p:ph type="body" sz="half" idx="3"/>
+          </p:nvPr>
+        </p:nvSpPr>
+        <p:spPr>
+          <a:xfrm>
+            <a:off x="4645025" y="1535112"/>
+            <a:ext cx="4041775" cy="750887"/>
+          </a:xfrm>
+        </p:spPr>
+        <p:txBody>
+          <a:bodyPr anchor="ctr"/>
+          <a:lstStyle>
+            <a:lvl1pPr marL="0" indent="0">
+              <a:buNone/>
+              <a:defRPr sz="2400" b="0" cap="all" baseline="0">
+                <a:solidFill>
+                  <a:schemeClr val="tx1"/>
+                </a:solidFill>
+              </a:defRPr>
+            </a:lvl1pPr>
+            <a:lvl2pPr>
+              <a:buNone/>
+              <a:defRPr sz="2000" b="1"/>
+            </a:lvl2pPr>
+            <a:lvl3pPr>
+              <a:buNone/>
+              <a:defRPr sz="1800" b="1"/>
+            </a:lvl3pPr>
+            <a:lvl4pPr>
               <a:buNone/>
               <a:defRPr sz="1600" b="1"/>
-            </a:lvl6pPr>
-            <a:lvl7pPr marL="2743200" indent="0">
+            </a:lvl4pPr>
+            <a:lvl5pPr>
               <a:buNone/>
               <a:defRPr sz="1600" b="1"/>
-            </a:lvl7pPr>
-            <a:lvl8pPr marL="3200400" indent="0">
-              <a:buNone/>
-              <a:defRPr sz="1600" b="1"/>
-            </a:lvl8pPr>
-            <a:lvl9pPr marL="3657600" indent="0">
-              <a:buNone/>
-              <a:defRPr sz="1600" b="1"/>
-            </a:lvl9pPr>
+            </a:lvl5pPr>
           </a:lstStyle>
           <a:p>
-            <a:pPr lvl="0"/>
-            <a:r>
-              <a:rPr lang="ru-RU" smtClean="0"/>
+            <a:pPr lvl="0" eaLnBrk="1" latinLnBrk="0" hangingPunct="1"/>
+            <a:r>
+              <a:rPr kumimoji="0" lang="ru-RU" smtClean="0"/>
               <a:t>Образец текста</a:t>
             </a:r>
           </a:p>
@@ -1481,18 +1533,18 @@
       </p:sp>
       <p:sp>
         <p:nvSpPr>
-          <p:cNvPr id="4" name="Содержимое 3"/>
-          <p:cNvSpPr>
-            <a:spLocks noGrp="1"/>
-          </p:cNvSpPr>
-          <p:nvPr>
-            <p:ph sz="half" idx="2"/>
+          <p:cNvPr id="5" name="Содержимое 4"/>
+          <p:cNvSpPr>
+            <a:spLocks noGrp="1"/>
+          </p:cNvSpPr>
+          <p:nvPr>
+            <p:ph sz="quarter" idx="2"/>
           </p:nvPr>
         </p:nvSpPr>
         <p:spPr>
           <a:xfrm>
-            <a:off x="457200" y="2174875"/>
-            <a:ext cx="4040188" cy="3951288"/>
+            <a:off x="457200" y="2362200"/>
+            <a:ext cx="4040188" cy="3763963"/>
           </a:xfrm>
         </p:spPr>
         <p:txBody>
@@ -1513,136 +1565,59 @@
             <a:lvl5pPr>
               <a:defRPr sz="1600"/>
             </a:lvl5pPr>
-            <a:lvl6pPr>
-              <a:defRPr sz="1600"/>
-            </a:lvl6pPr>
-            <a:lvl7pPr>
-              <a:defRPr sz="1600"/>
-            </a:lvl7pPr>
-            <a:lvl8pPr>
-              <a:defRPr sz="1600"/>
-            </a:lvl8pPr>
-            <a:lvl9pPr>
-              <a:defRPr sz="1600"/>
-            </a:lvl9pPr>
           </a:lstStyle>
           <a:p>
-            <a:pPr lvl="0"/>
+            <a:pPr lvl="0" eaLnBrk="1" latinLnBrk="0" hangingPunct="1"/>
             <a:r>
               <a:rPr lang="ru-RU" smtClean="0"/>
               <a:t>Образец текста</a:t>
             </a:r>
           </a:p>
           <a:p>
-            <a:pPr lvl="1"/>
+            <a:pPr lvl="1" eaLnBrk="1" latinLnBrk="0" hangingPunct="1"/>
             <a:r>
               <a:rPr lang="ru-RU" smtClean="0"/>
               <a:t>Второй уровень</a:t>
             </a:r>
           </a:p>
           <a:p>
-            <a:pPr lvl="2"/>
+            <a:pPr lvl="2" eaLnBrk="1" latinLnBrk="0" hangingPunct="1"/>
             <a:r>
               <a:rPr lang="ru-RU" smtClean="0"/>
               <a:t>Третий уровень</a:t>
             </a:r>
           </a:p>
           <a:p>
-            <a:pPr lvl="3"/>
+            <a:pPr lvl="3" eaLnBrk="1" latinLnBrk="0" hangingPunct="1"/>
             <a:r>
               <a:rPr lang="ru-RU" smtClean="0"/>
               <a:t>Четвертый уровень</a:t>
             </a:r>
           </a:p>
           <a:p>
-            <a:pPr lvl="4"/>
+            <a:pPr lvl="4" eaLnBrk="1" latinLnBrk="0" hangingPunct="1"/>
             <a:r>
               <a:rPr lang="ru-RU" smtClean="0"/>
               <a:t>Пятый уровень</a:t>
             </a:r>
-            <a:endParaRPr lang="ru-RU"/>
-          </a:p>
-        </p:txBody>
-      </p:sp>
-      <p:sp>
-        <p:nvSpPr>
-          <p:cNvPr id="5" name="Текст 4"/>
-          <p:cNvSpPr>
-            <a:spLocks noGrp="1"/>
-          </p:cNvSpPr>
-          <p:nvPr>
-            <p:ph type="body" sz="quarter" idx="3"/>
+            <a:endParaRPr kumimoji="0" lang="en-US"/>
+          </a:p>
+        </p:txBody>
+      </p:sp>
+      <p:sp>
+        <p:nvSpPr>
+          <p:cNvPr id="6" name="Содержимое 5"/>
+          <p:cNvSpPr>
+            <a:spLocks noGrp="1"/>
+          </p:cNvSpPr>
+          <p:nvPr>
+            <p:ph sz="quarter" idx="4"/>
           </p:nvPr>
         </p:nvSpPr>
         <p:spPr>
           <a:xfrm>
-            <a:off x="4645025" y="1535113"/>
-            <a:ext cx="4041775" cy="639762"/>
-          </a:xfrm>
-        </p:spPr>
-        <p:txBody>
-          <a:bodyPr anchor="b"/>
-          <a:lstStyle>
-            <a:lvl1pPr marL="0" indent="0">
-              <a:buNone/>
-              <a:defRPr sz="2400" b="1"/>
-            </a:lvl1pPr>
-            <a:lvl2pPr marL="457200" indent="0">
-              <a:buNone/>
-              <a:defRPr sz="2000" b="1"/>
-            </a:lvl2pPr>
-            <a:lvl3pPr marL="914400" indent="0">
-              <a:buNone/>
-              <a:defRPr sz="1800" b="1"/>
-            </a:lvl3pPr>
-            <a:lvl4pPr marL="1371600" indent="0">
-              <a:buNone/>
-              <a:defRPr sz="1600" b="1"/>
-            </a:lvl4pPr>
-            <a:lvl5pPr marL="1828800" indent="0">
-              <a:buNone/>
-              <a:defRPr sz="1600" b="1"/>
-            </a:lvl5pPr>
-            <a:lvl6pPr marL="2286000" indent="0">
-              <a:buNone/>
-              <a:defRPr sz="1600" b="1"/>
-            </a:lvl6pPr>
-            <a:lvl7pPr marL="2743200" indent="0">
-              <a:buNone/>
-              <a:defRPr sz="1600" b="1"/>
-            </a:lvl7pPr>
-            <a:lvl8pPr marL="3200400" indent="0">
-              <a:buNone/>
-              <a:defRPr sz="1600" b="1"/>
-            </a:lvl8pPr>
-            <a:lvl9pPr marL="3657600" indent="0">
-              <a:buNone/>
-              <a:defRPr sz="1600" b="1"/>
-            </a:lvl9pPr>
-          </a:lstStyle>
-          <a:p>
-            <a:pPr lvl="0"/>
-            <a:r>
-              <a:rPr lang="ru-RU" smtClean="0"/>
-              <a:t>Образец текста</a:t>
-            </a:r>
-          </a:p>
-        </p:txBody>
-      </p:sp>
-      <p:sp>
-        <p:nvSpPr>
-          <p:cNvPr id="6" name="Содержимое 5"/>
-          <p:cNvSpPr>
-            <a:spLocks noGrp="1"/>
-          </p:cNvSpPr>
-          <p:nvPr>
-            <p:ph sz="quarter" idx="4"/>
-          </p:nvPr>
-        </p:nvSpPr>
-        <p:spPr>
-          <a:xfrm>
-            <a:off x="4645025" y="2174875"/>
-            <a:ext cx="4041775" cy="3951288"/>
+            <a:off x="4645025" y="2362200"/>
+            <a:ext cx="4041775" cy="3763963"/>
           </a:xfrm>
         </p:spPr>
         <p:txBody>
@@ -1663,54 +1638,42 @@
             <a:lvl5pPr>
               <a:defRPr sz="1600"/>
             </a:lvl5pPr>
-            <a:lvl6pPr>
-              <a:defRPr sz="1600"/>
-            </a:lvl6pPr>
-            <a:lvl7pPr>
-              <a:defRPr sz="1600"/>
-            </a:lvl7pPr>
-            <a:lvl8pPr>
-              <a:defRPr sz="1600"/>
-            </a:lvl8pPr>
-            <a:lvl9pPr>
-              <a:defRPr sz="1600"/>
-            </a:lvl9pPr>
           </a:lstStyle>
           <a:p>
-            <a:pPr lvl="0"/>
+            <a:pPr lvl="0" eaLnBrk="1" latinLnBrk="0" hangingPunct="1"/>
             <a:r>
               <a:rPr lang="ru-RU" smtClean="0"/>
               <a:t>Образец текста</a:t>
             </a:r>
           </a:p>
           <a:p>
-            <a:pPr lvl="1"/>
+            <a:pPr lvl="1" eaLnBrk="1" latinLnBrk="0" hangingPunct="1"/>
             <a:r>
               <a:rPr lang="ru-RU" smtClean="0"/>
               <a:t>Второй уровень</a:t>
             </a:r>
           </a:p>
           <a:p>
-            <a:pPr lvl="2"/>
+            <a:pPr lvl="2" eaLnBrk="1" latinLnBrk="0" hangingPunct="1"/>
             <a:r>
               <a:rPr lang="ru-RU" smtClean="0"/>
               <a:t>Третий уровень</a:t>
             </a:r>
           </a:p>
           <a:p>
-            <a:pPr lvl="3"/>
+            <a:pPr lvl="3" eaLnBrk="1" latinLnBrk="0" hangingPunct="1"/>
             <a:r>
               <a:rPr lang="ru-RU" smtClean="0"/>
               <a:t>Четвертый уровень</a:t>
             </a:r>
           </a:p>
           <a:p>
-            <a:pPr lvl="4"/>
+            <a:pPr lvl="4" eaLnBrk="1" latinLnBrk="0" hangingPunct="1"/>
             <a:r>
               <a:rPr lang="ru-RU" smtClean="0"/>
               <a:t>Пятый уровень</a:t>
             </a:r>
-            <a:endParaRPr lang="ru-RU"/>
+            <a:endParaRPr kumimoji="0" lang="en-US"/>
           </a:p>
         </p:txBody>
       </p:sp>
@@ -1731,7 +1694,8 @@
           <a:p>
             <a:fld id="{5B106E36-FD25-4E2D-B0AA-010F637433A0}" type="datetimeFigureOut">
               <a:rPr lang="ru-RU" smtClean="0"/>
-              <a:t>03.11.2006</a:t>
+              <a:pPr/>
+              <a:t>06.10.2019</a:t>
             </a:fld>
             <a:endParaRPr lang="ru-RU"/>
           </a:p>
@@ -1773,6 +1737,7 @@
           <a:p>
             <a:fld id="{725C68B6-61C2-468F-89AB-4B9F7531AA68}" type="slidenum">
               <a:rPr lang="ru-RU" smtClean="0"/>
+              <a:pPr/>
               <a:t>‹#›</a:t>
             </a:fld>
             <a:endParaRPr lang="ru-RU"/>
@@ -1820,10 +1785,10 @@
           <a:lstStyle/>
           <a:p>
             <a:r>
-              <a:rPr lang="ru-RU" smtClean="0"/>
+              <a:rPr kumimoji="0" lang="ru-RU" smtClean="0"/>
               <a:t>Образец заголовка</a:t>
             </a:r>
-            <a:endParaRPr lang="ru-RU"/>
+            <a:endParaRPr kumimoji="0" lang="en-US"/>
           </a:p>
         </p:txBody>
       </p:sp>
@@ -1844,7 +1809,8 @@
           <a:p>
             <a:fld id="{5B106E36-FD25-4E2D-B0AA-010F637433A0}" type="datetimeFigureOut">
               <a:rPr lang="ru-RU" smtClean="0"/>
-              <a:t>03.11.2006</a:t>
+              <a:pPr/>
+              <a:t>06.10.2019</a:t>
             </a:fld>
             <a:endParaRPr lang="ru-RU"/>
           </a:p>
@@ -1886,6 +1852,7 @@
           <a:p>
             <a:fld id="{725C68B6-61C2-468F-89AB-4B9F7531AA68}" type="slidenum">
               <a:rPr lang="ru-RU" smtClean="0"/>
+              <a:pPr/>
               <a:t>‹#›</a:t>
             </a:fld>
             <a:endParaRPr lang="ru-RU"/>
@@ -1934,7 +1901,8 @@
           <a:p>
             <a:fld id="{5B106E36-FD25-4E2D-B0AA-010F637433A0}" type="datetimeFigureOut">
               <a:rPr lang="ru-RU" smtClean="0"/>
-              <a:t>03.11.2006</a:t>
+              <a:pPr/>
+              <a:t>06.10.2019</a:t>
             </a:fld>
             <a:endParaRPr lang="ru-RU"/>
           </a:p>
@@ -1976,6 +1944,7 @@
           <a:p>
             <a:fld id="{725C68B6-61C2-468F-89AB-4B9F7531AA68}" type="slidenum">
               <a:rPr lang="ru-RU" smtClean="0"/>
+              <a:pPr/>
               <a:t>‹#›</a:t>
             </a:fld>
             <a:endParaRPr lang="ru-RU"/>
@@ -2024,29 +1993,92 @@
           </a:xfrm>
         </p:spPr>
         <p:txBody>
-          <a:bodyPr anchor="b"/>
+          <a:bodyPr vert="horz" anchor="b">
+            <a:normAutofit/>
+            <a:sp3d prstMaterial="softEdge"/>
+          </a:bodyPr>
           <a:lstStyle>
             <a:lvl1pPr algn="l">
-              <a:defRPr sz="2000" b="1"/>
+              <a:buNone/>
+              <a:defRPr sz="2200" b="0">
+                <a:ln w="6350">
+                  <a:noFill/>
+                </a:ln>
+                <a:solidFill>
+                  <a:schemeClr val="accent1">
+                    <a:tint val="73000"/>
+                    <a:satMod val="180000"/>
+                  </a:schemeClr>
+                </a:solidFill>
+              </a:defRPr>
             </a:lvl1pPr>
           </a:lstStyle>
           <a:p>
             <a:r>
-              <a:rPr lang="ru-RU" smtClean="0"/>
+              <a:rPr kumimoji="0" lang="ru-RU" smtClean="0"/>
               <a:t>Образец заголовка</a:t>
             </a:r>
-            <a:endParaRPr lang="ru-RU"/>
-          </a:p>
-        </p:txBody>
-      </p:sp>
-      <p:sp>
-        <p:nvSpPr>
-          <p:cNvPr id="3" name="Содержимое 2"/>
-          <p:cNvSpPr>
-            <a:spLocks noGrp="1"/>
-          </p:cNvSpPr>
-          <p:nvPr>
-            <p:ph idx="1"/>
+            <a:endParaRPr kumimoji="0" lang="en-US"/>
+          </a:p>
+        </p:txBody>
+      </p:sp>
+      <p:sp>
+        <p:nvSpPr>
+          <p:cNvPr id="3" name="Текст 2"/>
+          <p:cNvSpPr>
+            <a:spLocks noGrp="1"/>
+          </p:cNvSpPr>
+          <p:nvPr>
+            <p:ph type="body" idx="2"/>
+          </p:nvPr>
+        </p:nvSpPr>
+        <p:spPr>
+          <a:xfrm>
+            <a:off x="457200" y="1524000"/>
+            <a:ext cx="3008313" cy="4602163"/>
+          </a:xfrm>
+        </p:spPr>
+        <p:txBody>
+          <a:bodyPr/>
+          <a:lstStyle>
+            <a:lvl1pPr marL="0" indent="0">
+              <a:buNone/>
+              <a:defRPr sz="1400"/>
+            </a:lvl1pPr>
+            <a:lvl2pPr>
+              <a:buNone/>
+              <a:defRPr sz="1200"/>
+            </a:lvl2pPr>
+            <a:lvl3pPr>
+              <a:buNone/>
+              <a:defRPr sz="1000"/>
+            </a:lvl3pPr>
+            <a:lvl4pPr>
+              <a:buNone/>
+              <a:defRPr sz="900"/>
+            </a:lvl4pPr>
+            <a:lvl5pPr>
+              <a:buNone/>
+              <a:defRPr sz="900"/>
+            </a:lvl5pPr>
+          </a:lstStyle>
+          <a:p>
+            <a:pPr lvl="0" eaLnBrk="1" latinLnBrk="0" hangingPunct="1"/>
+            <a:r>
+              <a:rPr kumimoji="0" lang="ru-RU" smtClean="0"/>
+              <a:t>Образец текста</a:t>
+            </a:r>
+          </a:p>
+        </p:txBody>
+      </p:sp>
+      <p:sp>
+        <p:nvSpPr>
+          <p:cNvPr id="4" name="Содержимое 3"/>
+          <p:cNvSpPr>
+            <a:spLocks noGrp="1"/>
+          </p:cNvSpPr>
+          <p:nvPr>
+            <p:ph sz="half" idx="1"/>
           </p:nvPr>
         </p:nvSpPr>
         <p:spPr>
@@ -2059,133 +2091,56 @@
           <a:bodyPr/>
           <a:lstStyle>
             <a:lvl1pPr>
-              <a:defRPr sz="3200"/>
+              <a:defRPr sz="2600"/>
             </a:lvl1pPr>
             <a:lvl2pPr>
-              <a:defRPr sz="2800"/>
+              <a:defRPr sz="2400"/>
             </a:lvl2pPr>
             <a:lvl3pPr>
-              <a:defRPr sz="2400"/>
+              <a:defRPr sz="2200"/>
             </a:lvl3pPr>
             <a:lvl4pPr>
               <a:defRPr sz="2000"/>
             </a:lvl4pPr>
             <a:lvl5pPr>
-              <a:defRPr sz="2000"/>
+              <a:defRPr sz="1800"/>
             </a:lvl5pPr>
-            <a:lvl6pPr>
-              <a:defRPr sz="2000"/>
-            </a:lvl6pPr>
-            <a:lvl7pPr>
-              <a:defRPr sz="2000"/>
-            </a:lvl7pPr>
-            <a:lvl8pPr>
-              <a:defRPr sz="2000"/>
-            </a:lvl8pPr>
-            <a:lvl9pPr>
-              <a:defRPr sz="2000"/>
-            </a:lvl9pPr>
           </a:lstStyle>
           <a:p>
-            <a:pPr lvl="0"/>
+            <a:pPr lvl="0" eaLnBrk="1" latinLnBrk="0" hangingPunct="1"/>
             <a:r>
               <a:rPr lang="ru-RU" smtClean="0"/>
               <a:t>Образец текста</a:t>
             </a:r>
           </a:p>
           <a:p>
-            <a:pPr lvl="1"/>
+            <a:pPr lvl="1" eaLnBrk="1" latinLnBrk="0" hangingPunct="1"/>
             <a:r>
               <a:rPr lang="ru-RU" smtClean="0"/>
               <a:t>Второй уровень</a:t>
             </a:r>
           </a:p>
           <a:p>
-            <a:pPr lvl="2"/>
+            <a:pPr lvl="2" eaLnBrk="1" latinLnBrk="0" hangingPunct="1"/>
             <a:r>
               <a:rPr lang="ru-RU" smtClean="0"/>
               <a:t>Третий уровень</a:t>
             </a:r>
           </a:p>
           <a:p>
-            <a:pPr lvl="3"/>
+            <a:pPr lvl="3" eaLnBrk="1" latinLnBrk="0" hangingPunct="1"/>
             <a:r>
               <a:rPr lang="ru-RU" smtClean="0"/>
               <a:t>Четвертый уровень</a:t>
             </a:r>
           </a:p>
           <a:p>
-            <a:pPr lvl="4"/>
+            <a:pPr lvl="4" eaLnBrk="1" latinLnBrk="0" hangingPunct="1"/>
             <a:r>
               <a:rPr lang="ru-RU" smtClean="0"/>
               <a:t>Пятый уровень</a:t>
             </a:r>
-            <a:endParaRPr lang="ru-RU"/>
-          </a:p>
-        </p:txBody>
-      </p:sp>
-      <p:sp>
-        <p:nvSpPr>
-          <p:cNvPr id="4" name="Текст 3"/>
-          <p:cNvSpPr>
-            <a:spLocks noGrp="1"/>
-          </p:cNvSpPr>
-          <p:nvPr>
-            <p:ph type="body" sz="half" idx="2"/>
-          </p:nvPr>
-        </p:nvSpPr>
-        <p:spPr>
-          <a:xfrm>
-            <a:off x="457200" y="1435100"/>
-            <a:ext cx="3008313" cy="4691063"/>
-          </a:xfrm>
-        </p:spPr>
-        <p:txBody>
-          <a:bodyPr/>
-          <a:lstStyle>
-            <a:lvl1pPr marL="0" indent="0">
-              <a:buNone/>
-              <a:defRPr sz="1400"/>
-            </a:lvl1pPr>
-            <a:lvl2pPr marL="457200" indent="0">
-              <a:buNone/>
-              <a:defRPr sz="1200"/>
-            </a:lvl2pPr>
-            <a:lvl3pPr marL="914400" indent="0">
-              <a:buNone/>
-              <a:defRPr sz="1000"/>
-            </a:lvl3pPr>
-            <a:lvl4pPr marL="1371600" indent="0">
-              <a:buNone/>
-              <a:defRPr sz="900"/>
-            </a:lvl4pPr>
-            <a:lvl5pPr marL="1828800" indent="0">
-              <a:buNone/>
-              <a:defRPr sz="900"/>
-            </a:lvl5pPr>
-            <a:lvl6pPr marL="2286000" indent="0">
-              <a:buNone/>
-              <a:defRPr sz="900"/>
-            </a:lvl6pPr>
-            <a:lvl7pPr marL="2743200" indent="0">
-              <a:buNone/>
-              <a:defRPr sz="900"/>
-            </a:lvl7pPr>
-            <a:lvl8pPr marL="3200400" indent="0">
-              <a:buNone/>
-              <a:defRPr sz="900"/>
-            </a:lvl8pPr>
-            <a:lvl9pPr marL="3657600" indent="0">
-              <a:buNone/>
-              <a:defRPr sz="900"/>
-            </a:lvl9pPr>
-          </a:lstStyle>
-          <a:p>
-            <a:pPr lvl="0"/>
-            <a:r>
-              <a:rPr lang="ru-RU" smtClean="0"/>
-              <a:t>Образец текста</a:t>
-            </a:r>
+            <a:endParaRPr kumimoji="0" lang="en-US"/>
           </a:p>
         </p:txBody>
       </p:sp>
@@ -2206,7 +2161,8 @@
           <a:p>
             <a:fld id="{5B106E36-FD25-4E2D-B0AA-010F637433A0}" type="datetimeFigureOut">
               <a:rPr lang="ru-RU" smtClean="0"/>
-              <a:t>03.11.2006</a:t>
+              <a:pPr/>
+              <a:t>06.10.2019</a:t>
             </a:fld>
             <a:endParaRPr lang="ru-RU"/>
           </a:p>
@@ -2248,6 +2204,7 @@
           <a:p>
             <a:fld id="{725C68B6-61C2-468F-89AB-4B9F7531AA68}" type="slidenum">
               <a:rPr lang="ru-RU" smtClean="0"/>
+              <a:pPr/>
               <a:t>‹#›</a:t>
             </a:fld>
             <a:endParaRPr lang="ru-RU"/>
@@ -2291,23 +2248,26 @@
         </p:nvSpPr>
         <p:spPr>
           <a:xfrm>
-            <a:off x="1792288" y="4800600"/>
-            <a:ext cx="5486400" cy="566738"/>
+            <a:off x="1828800" y="609600"/>
+            <a:ext cx="5486400" cy="522288"/>
           </a:xfrm>
         </p:spPr>
         <p:txBody>
-          <a:bodyPr anchor="b"/>
+          <a:bodyPr lIns="45720" rIns="45720" bIns="0" anchor="b">
+            <a:sp3d prstMaterial="softEdge"/>
+          </a:bodyPr>
           <a:lstStyle>
-            <a:lvl1pPr algn="l">
+            <a:lvl1pPr algn="ctr">
+              <a:buNone/>
               <a:defRPr sz="2000" b="1"/>
             </a:lvl1pPr>
           </a:lstStyle>
           <a:p>
             <a:r>
-              <a:rPr lang="ru-RU" smtClean="0"/>
+              <a:rPr kumimoji="0" lang="ru-RU" smtClean="0"/>
               <a:t>Образец заголовка</a:t>
             </a:r>
-            <a:endParaRPr lang="ru-RU"/>
+            <a:endParaRPr kumimoji="0" lang="en-US"/>
           </a:p>
         </p:txBody>
       </p:sp>
@@ -2323,52 +2283,85 @@
         </p:nvSpPr>
         <p:spPr>
           <a:xfrm>
-            <a:off x="1792288" y="612775"/>
-            <a:ext cx="5486400" cy="4114800"/>
+            <a:off x="1828800" y="1831975"/>
+            <a:ext cx="5486400" cy="3962400"/>
           </a:xfrm>
+          <a:solidFill>
+            <a:schemeClr val="bg2"/>
+          </a:solidFill>
+          <a:ln w="44450" cap="sq" cmpd="sng" algn="ctr">
+            <a:solidFill>
+              <a:srgbClr val="FFFFFF"/>
+            </a:solidFill>
+            <a:prstDash val="solid"/>
+            <a:miter lim="800000"/>
+          </a:ln>
+          <a:effectLst>
+            <a:outerShdw blurRad="190500" dist="228600" dir="2700000" sy="90000">
+              <a:srgbClr val="000000">
+                <a:alpha val="25000"/>
+              </a:srgbClr>
+            </a:outerShdw>
+          </a:effectLst>
+          <a:scene3d>
+            <a:camera prst="orthographicFront">
+              <a:rot lat="0" lon="0" rev="0"/>
+            </a:camera>
+            <a:lightRig rig="balanced" dir="tr">
+              <a:rot lat="0" lon="0" rev="2700000"/>
+            </a:lightRig>
+          </a:scene3d>
+          <a:sp3d prstMaterial="matte">
+            <a:contourClr>
+              <a:schemeClr val="tx2">
+                <a:shade val="50000"/>
+              </a:schemeClr>
+            </a:contourClr>
+          </a:sp3d>
         </p:spPr>
-        <p:txBody>
-          <a:bodyPr/>
+        <p:style>
+          <a:lnRef idx="3">
+            <a:schemeClr val="lt1"/>
+          </a:lnRef>
+          <a:fillRef idx="1">
+            <a:schemeClr val="accent1"/>
+          </a:fillRef>
+          <a:effectRef idx="1">
+            <a:schemeClr val="accent1"/>
+          </a:effectRef>
+          <a:fontRef idx="minor">
+            <a:schemeClr val="lt1"/>
+          </a:fontRef>
+        </p:style>
+        <p:txBody>
+          <a:bodyPr anchor="t"/>
           <a:lstStyle>
-            <a:lvl1pPr marL="0" indent="0">
+            <a:lvl1pPr indent="0">
               <a:buNone/>
               <a:defRPr sz="3200"/>
             </a:lvl1pPr>
-            <a:lvl2pPr marL="457200" indent="0">
-              <a:buNone/>
-              <a:defRPr sz="2800"/>
-            </a:lvl2pPr>
-            <a:lvl3pPr marL="914400" indent="0">
-              <a:buNone/>
-              <a:defRPr sz="2400"/>
-            </a:lvl3pPr>
-            <a:lvl4pPr marL="1371600" indent="0">
-              <a:buNone/>
-              <a:defRPr sz="2000"/>
-            </a:lvl4pPr>
-            <a:lvl5pPr marL="1828800" indent="0">
-              <a:buNone/>
-              <a:defRPr sz="2000"/>
-            </a:lvl5pPr>
-            <a:lvl6pPr marL="2286000" indent="0">
-              <a:buNone/>
-              <a:defRPr sz="2000"/>
-            </a:lvl6pPr>
-            <a:lvl7pPr marL="2743200" indent="0">
-              <a:buNone/>
-              <a:defRPr sz="2000"/>
-            </a:lvl7pPr>
-            <a:lvl8pPr marL="3200400" indent="0">
-              <a:buNone/>
-              <a:defRPr sz="2000"/>
-            </a:lvl8pPr>
-            <a:lvl9pPr marL="3657600" indent="0">
-              <a:buNone/>
-              <a:defRPr sz="2000"/>
-            </a:lvl9pPr>
           </a:lstStyle>
           <a:p>
-            <a:endParaRPr lang="ru-RU"/>
+            <a:pPr marL="0" algn="l" rtl="0" eaLnBrk="1" latinLnBrk="0" hangingPunct="1"/>
+            <a:r>
+              <a:rPr kumimoji="0" lang="ru-RU" smtClean="0">
+                <a:solidFill>
+                  <a:schemeClr val="lt1"/>
+                </a:solidFill>
+                <a:latin typeface="+mn-lt"/>
+                <a:ea typeface="+mn-ea"/>
+                <a:cs typeface="+mn-cs"/>
+              </a:rPr>
+              <a:t>Вставка рисунка</a:t>
+            </a:r>
+            <a:endParaRPr kumimoji="0" lang="en-US" dirty="0">
+              <a:solidFill>
+                <a:schemeClr val="lt1"/>
+              </a:solidFill>
+              <a:latin typeface="+mn-lt"/>
+              <a:ea typeface="+mn-ea"/>
+              <a:cs typeface="+mn-cs"/>
+            </a:endParaRPr>
           </a:p>
         </p:txBody>
       </p:sp>
@@ -2384,54 +2377,34 @@
         </p:nvSpPr>
         <p:spPr>
           <a:xfrm>
-            <a:off x="1792288" y="5367338"/>
-            <a:ext cx="5486400" cy="804862"/>
+            <a:off x="1828800" y="1166787"/>
+            <a:ext cx="5486400" cy="530352"/>
           </a:xfrm>
         </p:spPr>
         <p:txBody>
-          <a:bodyPr/>
+          <a:bodyPr lIns="45720" tIns="45720" rIns="45720" anchor="t"/>
           <a:lstStyle>
-            <a:lvl1pPr marL="0" indent="0">
+            <a:lvl1pPr marL="0" indent="0" algn="ctr">
               <a:buNone/>
               <a:defRPr sz="1400"/>
             </a:lvl1pPr>
-            <a:lvl2pPr marL="457200" indent="0">
-              <a:buNone/>
+            <a:lvl2pPr>
               <a:defRPr sz="1200"/>
             </a:lvl2pPr>
-            <a:lvl3pPr marL="914400" indent="0">
-              <a:buNone/>
+            <a:lvl3pPr>
               <a:defRPr sz="1000"/>
             </a:lvl3pPr>
-            <a:lvl4pPr marL="1371600" indent="0">
-              <a:buNone/>
+            <a:lvl4pPr>
               <a:defRPr sz="900"/>
             </a:lvl4pPr>
-            <a:lvl5pPr marL="1828800" indent="0">
-              <a:buNone/>
+            <a:lvl5pPr>
               <a:defRPr sz="900"/>
             </a:lvl5pPr>
-            <a:lvl6pPr marL="2286000" indent="0">
-              <a:buNone/>
-              <a:defRPr sz="900"/>
-            </a:lvl6pPr>
-            <a:lvl7pPr marL="2743200" indent="0">
-              <a:buNone/>
-              <a:defRPr sz="900"/>
-            </a:lvl7pPr>
-            <a:lvl8pPr marL="3200400" indent="0">
-              <a:buNone/>
-              <a:defRPr sz="900"/>
-            </a:lvl8pPr>
-            <a:lvl9pPr marL="3657600" indent="0">
-              <a:buNone/>
-              <a:defRPr sz="900"/>
-            </a:lvl9pPr>
           </a:lstStyle>
           <a:p>
-            <a:pPr lvl="0"/>
-            <a:r>
-              <a:rPr lang="ru-RU" smtClean="0"/>
+            <a:pPr lvl="0" eaLnBrk="1" latinLnBrk="0" hangingPunct="1"/>
+            <a:r>
+              <a:rPr kumimoji="0" lang="ru-RU" smtClean="0"/>
               <a:t>Образец текста</a:t>
             </a:r>
           </a:p>
@@ -2454,7 +2427,8 @@
           <a:p>
             <a:fld id="{5B106E36-FD25-4E2D-B0AA-010F637433A0}" type="datetimeFigureOut">
               <a:rPr lang="ru-RU" smtClean="0"/>
-              <a:t>03.11.2006</a:t>
+              <a:pPr/>
+              <a:t>06.10.2019</a:t>
             </a:fld>
             <a:endParaRPr lang="ru-RU"/>
           </a:p>
@@ -2496,6 +2470,7 @@
           <a:p>
             <a:fld id="{725C68B6-61C2-468F-89AB-4B9F7531AA68}" type="slidenum">
               <a:rPr lang="ru-RU" smtClean="0"/>
+              <a:pPr/>
               <a:t>‹#›</a:t>
             </a:fld>
             <a:endParaRPr lang="ru-RU"/>
@@ -2514,8 +2489,8 @@
 <p:sldMaster xmlns:a="http://schemas.openxmlformats.org/drawingml/2006/main" xmlns:r="http://schemas.openxmlformats.org/officeDocument/2006/relationships" xmlns:p="http://schemas.openxmlformats.org/presentationml/2006/main">
   <p:cSld>
     <p:bg>
-      <p:bgRef idx="1001">
-        <a:schemeClr val="bg1"/>
+      <p:bgRef idx="1003">
+        <a:schemeClr val="bg2"/>
       </p:bgRef>
     </p:bg>
     <p:spTree>
@@ -2534,7 +2509,7 @@
       </p:grpSpPr>
       <p:sp>
         <p:nvSpPr>
-          <p:cNvPr id="2" name="Заголовок 1"/>
+          <p:cNvPr id="22" name="Заголовок 21"/>
           <p:cNvSpPr>
             <a:spLocks noGrp="1"/>
           </p:cNvSpPr>
@@ -2552,22 +2527,31 @@
           </a:prstGeom>
         </p:spPr>
         <p:txBody>
-          <a:bodyPr vert="horz" lIns="91440" tIns="45720" rIns="91440" bIns="45720" rtlCol="0" anchor="ctr">
+          <a:bodyPr vert="horz" anchor="ctr">
             <a:normAutofit/>
+            <a:scene3d>
+              <a:camera prst="orthographicFront"/>
+              <a:lightRig rig="soft" dir="t">
+                <a:rot lat="0" lon="0" rev="16800000"/>
+              </a:lightRig>
+            </a:scene3d>
+            <a:sp3d prstMaterial="softEdge">
+              <a:bevelT w="38100" h="38100"/>
+            </a:sp3d>
           </a:bodyPr>
           <a:lstStyle/>
           <a:p>
             <a:r>
-              <a:rPr lang="ru-RU" smtClean="0"/>
+              <a:rPr kumimoji="0" lang="ru-RU" smtClean="0"/>
               <a:t>Образец заголовка</a:t>
             </a:r>
-            <a:endParaRPr lang="ru-RU"/>
-          </a:p>
-        </p:txBody>
-      </p:sp>
-      <p:sp>
-        <p:nvSpPr>
-          <p:cNvPr id="3" name="Текст 2"/>
+            <a:endParaRPr kumimoji="0" lang="en-US"/>
+          </a:p>
+        </p:txBody>
+      </p:sp>
+      <p:sp>
+        <p:nvSpPr>
+          <p:cNvPr id="13" name="Текст 12"/>
           <p:cNvSpPr>
             <a:spLocks noGrp="1"/>
           </p:cNvSpPr>
@@ -2578,58 +2562,58 @@
         <p:spPr>
           <a:xfrm>
             <a:off x="457200" y="1600200"/>
-            <a:ext cx="8229600" cy="4525963"/>
+            <a:ext cx="8229600" cy="4709160"/>
           </a:xfrm>
           <a:prstGeom prst="rect">
             <a:avLst/>
           </a:prstGeom>
         </p:spPr>
         <p:txBody>
-          <a:bodyPr vert="horz" lIns="91440" tIns="45720" rIns="91440" bIns="45720" rtlCol="0">
+          <a:bodyPr vert="horz">
             <a:normAutofit/>
           </a:bodyPr>
           <a:lstStyle/>
           <a:p>
-            <a:pPr lvl="0"/>
-            <a:r>
-              <a:rPr lang="ru-RU" smtClean="0"/>
+            <a:pPr lvl="0" eaLnBrk="1" latinLnBrk="0" hangingPunct="1"/>
+            <a:r>
+              <a:rPr kumimoji="0" lang="ru-RU" smtClean="0"/>
               <a:t>Образец текста</a:t>
             </a:r>
           </a:p>
           <a:p>
-            <a:pPr lvl="1"/>
-            <a:r>
-              <a:rPr lang="ru-RU" smtClean="0"/>
+            <a:pPr lvl="1" eaLnBrk="1" latinLnBrk="0" hangingPunct="1"/>
+            <a:r>
+              <a:rPr kumimoji="0" lang="ru-RU" smtClean="0"/>
               <a:t>Второй уровень</a:t>
             </a:r>
           </a:p>
           <a:p>
-            <a:pPr lvl="2"/>
-            <a:r>
-              <a:rPr lang="ru-RU" smtClean="0"/>
+            <a:pPr lvl="2" eaLnBrk="1" latinLnBrk="0" hangingPunct="1"/>
+            <a:r>
+              <a:rPr kumimoji="0" lang="ru-RU" smtClean="0"/>
               <a:t>Третий уровень</a:t>
             </a:r>
           </a:p>
           <a:p>
-            <a:pPr lvl="3"/>
-            <a:r>
-              <a:rPr lang="ru-RU" smtClean="0"/>
+            <a:pPr lvl="3" eaLnBrk="1" latinLnBrk="0" hangingPunct="1"/>
+            <a:r>
+              <a:rPr kumimoji="0" lang="ru-RU" smtClean="0"/>
               <a:t>Четвертый уровень</a:t>
             </a:r>
           </a:p>
           <a:p>
-            <a:pPr lvl="4"/>
-            <a:r>
-              <a:rPr lang="ru-RU" smtClean="0"/>
+            <a:pPr lvl="4" eaLnBrk="1" latinLnBrk="0" hangingPunct="1"/>
+            <a:r>
+              <a:rPr kumimoji="0" lang="ru-RU" smtClean="0"/>
               <a:t>Пятый уровень</a:t>
             </a:r>
-            <a:endParaRPr lang="ru-RU"/>
-          </a:p>
-        </p:txBody>
-      </p:sp>
-      <p:sp>
-        <p:nvSpPr>
-          <p:cNvPr id="4" name="Дата 3"/>
+            <a:endParaRPr kumimoji="0" lang="en-US"/>
+          </a:p>
+        </p:txBody>
+      </p:sp>
+      <p:sp>
+        <p:nvSpPr>
+          <p:cNvPr id="14" name="Дата 13"/>
           <p:cNvSpPr>
             <a:spLocks noGrp="1"/>
           </p:cNvSpPr>
@@ -2639,7 +2623,7 @@
         </p:nvSpPr>
         <p:spPr>
           <a:xfrm>
-            <a:off x="457200" y="6356350"/>
+            <a:off x="457200" y="6416675"/>
             <a:ext cx="2133600" cy="365125"/>
           </a:xfrm>
           <a:prstGeom prst="rect">
@@ -2647,13 +2631,13 @@
           </a:prstGeom>
         </p:spPr>
         <p:txBody>
-          <a:bodyPr vert="horz" lIns="91440" tIns="45720" rIns="91440" bIns="45720" rtlCol="0" anchor="ctr"/>
+          <a:bodyPr vert="horz" anchor="b"/>
           <a:lstStyle>
-            <a:lvl1pPr algn="l">
-              <a:defRPr sz="1200">
+            <a:lvl1pPr algn="l" eaLnBrk="1" latinLnBrk="0" hangingPunct="1">
+              <a:defRPr kumimoji="0" sz="1200">
                 <a:solidFill>
                   <a:schemeClr val="tx1">
-                    <a:tint val="75000"/>
+                    <a:shade val="50000"/>
                   </a:schemeClr>
                 </a:solidFill>
               </a:defRPr>
@@ -2662,7 +2646,8 @@
           <a:p>
             <a:fld id="{5B106E36-FD25-4E2D-B0AA-010F637433A0}" type="datetimeFigureOut">
               <a:rPr lang="ru-RU" smtClean="0"/>
-              <a:t>03.11.2006</a:t>
+              <a:pPr/>
+              <a:t>06.10.2019</a:t>
             </a:fld>
             <a:endParaRPr lang="ru-RU"/>
           </a:p>
@@ -2670,7 +2655,7 @@
       </p:sp>
       <p:sp>
         <p:nvSpPr>
-          <p:cNvPr id="5" name="Нижний колонтитул 4"/>
+          <p:cNvPr id="3" name="Нижний колонтитул 2"/>
           <p:cNvSpPr>
             <a:spLocks noGrp="1"/>
           </p:cNvSpPr>
@@ -2680,7 +2665,7 @@
         </p:nvSpPr>
         <p:spPr>
           <a:xfrm>
-            <a:off x="3124200" y="6356350"/>
+            <a:off x="3124200" y="6416675"/>
             <a:ext cx="2895600" cy="365125"/>
           </a:xfrm>
           <a:prstGeom prst="rect">
@@ -2688,13 +2673,13 @@
           </a:prstGeom>
         </p:spPr>
         <p:txBody>
-          <a:bodyPr vert="horz" lIns="91440" tIns="45720" rIns="91440" bIns="45720" rtlCol="0" anchor="ctr"/>
+          <a:bodyPr vert="horz" anchor="b"/>
           <a:lstStyle>
-            <a:lvl1pPr algn="ctr">
-              <a:defRPr sz="1200">
+            <a:lvl1pPr algn="ctr" eaLnBrk="1" latinLnBrk="0" hangingPunct="1">
+              <a:defRPr kumimoji="0" sz="1200">
                 <a:solidFill>
                   <a:schemeClr val="tx1">
-                    <a:tint val="75000"/>
+                    <a:shade val="50000"/>
                   </a:schemeClr>
                 </a:solidFill>
               </a:defRPr>
@@ -2707,7 +2692,7 @@
       </p:sp>
       <p:sp>
         <p:nvSpPr>
-          <p:cNvPr id="6" name="Номер слайда 5"/>
+          <p:cNvPr id="23" name="Номер слайда 22"/>
           <p:cNvSpPr>
             <a:spLocks noGrp="1"/>
           </p:cNvSpPr>
@@ -2717,21 +2702,21 @@
         </p:nvSpPr>
         <p:spPr>
           <a:xfrm>
-            <a:off x="6553200" y="6356350"/>
-            <a:ext cx="2133600" cy="365125"/>
+            <a:off x="7924800" y="6416675"/>
+            <a:ext cx="762000" cy="365125"/>
           </a:xfrm>
           <a:prstGeom prst="rect">
             <a:avLst/>
           </a:prstGeom>
         </p:spPr>
         <p:txBody>
-          <a:bodyPr vert="horz" lIns="91440" tIns="45720" rIns="91440" bIns="45720" rtlCol="0" anchor="ctr"/>
+          <a:bodyPr vert="horz" lIns="0" rIns="0" anchor="b"/>
           <a:lstStyle>
-            <a:lvl1pPr algn="r">
-              <a:defRPr sz="1200">
+            <a:lvl1pPr algn="r" eaLnBrk="1" latinLnBrk="0" hangingPunct="1">
+              <a:defRPr kumimoji="0" sz="1200">
                 <a:solidFill>
                   <a:schemeClr val="tx1">
-                    <a:tint val="75000"/>
+                    <a:shade val="50000"/>
                   </a:schemeClr>
                 </a:solidFill>
               </a:defRPr>
@@ -2740,6 +2725,7 @@
           <a:p>
             <a:fld id="{725C68B6-61C2-468F-89AB-4B9F7531AA68}" type="slidenum">
               <a:rPr lang="ru-RU" smtClean="0"/>
+              <a:pPr/>
               <a:t>‹#›</a:t>
             </a:fld>
             <a:endParaRPr lang="ru-RU"/>
@@ -2748,31 +2734,61 @@
       </p:sp>
     </p:spTree>
   </p:cSld>
-  <p:clrMap bg1="lt1" tx1="dk1" bg2="lt2" tx2="dk2" accent1="accent1" accent2="accent2" accent3="accent3" accent4="accent4" accent5="accent5" accent6="accent6" hlink="hlink" folHlink="folHlink"/>
+  <p:clrMap bg1="dk1" tx1="lt1" bg2="dk2" tx2="lt2" accent1="accent1" accent2="accent2" accent3="accent3" accent4="accent4" accent5="accent5" accent6="accent6" hlink="hlink" folHlink="folHlink"/>
   <p:sldLayoutIdLst>
-    <p:sldLayoutId id="2147483649" r:id="rId1"/>
-    <p:sldLayoutId id="2147483650" r:id="rId2"/>
-    <p:sldLayoutId id="2147483651" r:id="rId3"/>
-    <p:sldLayoutId id="2147483652" r:id="rId4"/>
-    <p:sldLayoutId id="2147483653" r:id="rId5"/>
-    <p:sldLayoutId id="2147483654" r:id="rId6"/>
-    <p:sldLayoutId id="2147483655" r:id="rId7"/>
-    <p:sldLayoutId id="2147483656" r:id="rId8"/>
-    <p:sldLayoutId id="2147483657" r:id="rId9"/>
-    <p:sldLayoutId id="2147483658" r:id="rId10"/>
-    <p:sldLayoutId id="2147483659" r:id="rId11"/>
+    <p:sldLayoutId id="2147483661" r:id="rId1"/>
+    <p:sldLayoutId id="2147483662" r:id="rId2"/>
+    <p:sldLayoutId id="2147483663" r:id="rId3"/>
+    <p:sldLayoutId id="2147483664" r:id="rId4"/>
+    <p:sldLayoutId id="2147483665" r:id="rId5"/>
+    <p:sldLayoutId id="2147483666" r:id="rId6"/>
+    <p:sldLayoutId id="2147483667" r:id="rId7"/>
+    <p:sldLayoutId id="2147483668" r:id="rId8"/>
+    <p:sldLayoutId id="2147483669" r:id="rId9"/>
+    <p:sldLayoutId id="2147483670" r:id="rId10"/>
+    <p:sldLayoutId id="2147483671" r:id="rId11"/>
   </p:sldLayoutIdLst>
   <p:txStyles>
     <p:titleStyle>
-      <a:lvl1pPr algn="ctr" defTabSz="914400" rtl="0" eaLnBrk="1" latinLnBrk="0" hangingPunct="1">
+      <a:lvl1pPr algn="ctr" rtl="0" eaLnBrk="1" latinLnBrk="0" hangingPunct="1">
         <a:spcBef>
           <a:spcPct val="0"/>
         </a:spcBef>
         <a:buNone/>
-        <a:defRPr sz="4400" kern="1200">
-          <a:solidFill>
-            <a:schemeClr val="tx1"/>
-          </a:solidFill>
+        <a:defRPr kumimoji="0" sz="4100" b="1" kern="1200" cap="none" baseline="0">
+          <a:ln w="6350">
+            <a:noFill/>
+          </a:ln>
+          <a:gradFill>
+            <a:gsLst>
+              <a:gs pos="0">
+                <a:schemeClr val="accent1">
+                  <a:tint val="73000"/>
+                  <a:satMod val="145000"/>
+                </a:schemeClr>
+              </a:gs>
+              <a:gs pos="73000">
+                <a:schemeClr val="accent1">
+                  <a:tint val="73000"/>
+                  <a:satMod val="145000"/>
+                </a:schemeClr>
+              </a:gs>
+              <a:gs pos="100000">
+                <a:schemeClr val="accent1">
+                  <a:tint val="83000"/>
+                  <a:satMod val="143000"/>
+                </a:schemeClr>
+              </a:gs>
+            </a:gsLst>
+            <a:lin ang="4800000" scaled="1"/>
+          </a:gradFill>
+          <a:effectLst>
+            <a:outerShdw blurRad="114300" dist="101600" dir="2700000" algn="tl" rotWithShape="0">
+              <a:srgbClr val="000000">
+                <a:alpha val="40000"/>
+              </a:srgbClr>
+            </a:outerShdw>
+          </a:effectLst>
           <a:latin typeface="+mj-lt"/>
           <a:ea typeface="+mj-ea"/>
           <a:cs typeface="+mj-cs"/>
@@ -2780,13 +2796,19 @@
       </a:lvl1pPr>
     </p:titleStyle>
     <p:bodyStyle>
-      <a:lvl1pPr marL="342900" indent="-342900" algn="l" defTabSz="914400" rtl="0" eaLnBrk="1" latinLnBrk="0" hangingPunct="1">
+      <a:lvl1pPr marL="548640" indent="-411480" algn="l" rtl="0" eaLnBrk="1" latinLnBrk="0" hangingPunct="1">
         <a:spcBef>
           <a:spcPct val="20000"/>
         </a:spcBef>
-        <a:buFont typeface="Arial" pitchFamily="34" charset="0"/>
-        <a:buChar char="•"/>
-        <a:defRPr sz="3200" kern="1200">
+        <a:buClr>
+          <a:schemeClr val="tx1">
+            <a:shade val="95000"/>
+          </a:schemeClr>
+        </a:buClr>
+        <a:buSzPct val="65000"/>
+        <a:buFont typeface="Wingdings 2"/>
+        <a:buChar char=""/>
+        <a:defRPr kumimoji="0" sz="2800" kern="1200">
           <a:solidFill>
             <a:schemeClr val="tx1"/>
           </a:solidFill>
@@ -2795,13 +2817,17 @@
           <a:cs typeface="+mn-cs"/>
         </a:defRPr>
       </a:lvl1pPr>
-      <a:lvl2pPr marL="742950" indent="-285750" algn="l" defTabSz="914400" rtl="0" eaLnBrk="1" latinLnBrk="0" hangingPunct="1">
+      <a:lvl2pPr marL="868680" indent="-283464" algn="l" rtl="0" eaLnBrk="1" latinLnBrk="0" hangingPunct="1">
         <a:spcBef>
           <a:spcPct val="20000"/>
         </a:spcBef>
-        <a:buFont typeface="Arial" pitchFamily="34" charset="0"/>
-        <a:buChar char="–"/>
-        <a:defRPr sz="2800" kern="1200">
+        <a:buClr>
+          <a:schemeClr val="tx1"/>
+        </a:buClr>
+        <a:buSzPct val="80000"/>
+        <a:buFont typeface="Wingdings 2"/>
+        <a:buChar char=""/>
+        <a:defRPr kumimoji="0" sz="2400" kern="1200">
           <a:solidFill>
             <a:schemeClr val="tx1"/>
           </a:solidFill>
@@ -2810,13 +2836,17 @@
           <a:cs typeface="+mn-cs"/>
         </a:defRPr>
       </a:lvl2pPr>
-      <a:lvl3pPr marL="1143000" indent="-228600" algn="l" defTabSz="914400" rtl="0" eaLnBrk="1" latinLnBrk="0" hangingPunct="1">
+      <a:lvl3pPr marL="1133856" indent="-228600" algn="l" rtl="0" eaLnBrk="1" latinLnBrk="0" hangingPunct="1">
         <a:spcBef>
           <a:spcPct val="20000"/>
         </a:spcBef>
-        <a:buFont typeface="Arial" pitchFamily="34" charset="0"/>
-        <a:buChar char="•"/>
-        <a:defRPr sz="2400" kern="1200">
+        <a:buClr>
+          <a:schemeClr val="tx1"/>
+        </a:buClr>
+        <a:buSzPct val="95000"/>
+        <a:buFont typeface="Wingdings"/>
+        <a:buChar char=""/>
+        <a:defRPr kumimoji="0" sz="2200" kern="1200">
           <a:solidFill>
             <a:schemeClr val="tx1"/>
           </a:solidFill>
@@ -2825,13 +2855,17 @@
           <a:cs typeface="+mn-cs"/>
         </a:defRPr>
       </a:lvl3pPr>
-      <a:lvl4pPr marL="1600200" indent="-228600" algn="l" defTabSz="914400" rtl="0" eaLnBrk="1" latinLnBrk="0" hangingPunct="1">
+      <a:lvl4pPr marL="1353312" indent="-182880" algn="l" rtl="0" eaLnBrk="1" latinLnBrk="0" hangingPunct="1">
         <a:spcBef>
           <a:spcPct val="20000"/>
         </a:spcBef>
-        <a:buFont typeface="Arial" pitchFamily="34" charset="0"/>
-        <a:buChar char="–"/>
-        <a:defRPr sz="2000" kern="1200">
+        <a:buClr>
+          <a:schemeClr val="tx1"/>
+        </a:buClr>
+        <a:buSzPct val="100000"/>
+        <a:buFont typeface="Wingdings 3"/>
+        <a:buChar char=""/>
+        <a:defRPr kumimoji="0" sz="2000" kern="1200">
           <a:solidFill>
             <a:schemeClr val="tx1"/>
           </a:solidFill>
@@ -2840,13 +2874,16 @@
           <a:cs typeface="+mn-cs"/>
         </a:defRPr>
       </a:lvl4pPr>
-      <a:lvl5pPr marL="2057400" indent="-228600" algn="l" defTabSz="914400" rtl="0" eaLnBrk="1" latinLnBrk="0" hangingPunct="1">
+      <a:lvl5pPr marL="1545336" indent="-182880" algn="l" rtl="0" eaLnBrk="1" latinLnBrk="0" hangingPunct="1">
         <a:spcBef>
           <a:spcPct val="20000"/>
         </a:spcBef>
-        <a:buFont typeface="Arial" pitchFamily="34" charset="0"/>
-        <a:buChar char="»"/>
-        <a:defRPr sz="2000" kern="1200">
+        <a:buClr>
+          <a:schemeClr val="tx1"/>
+        </a:buClr>
+        <a:buFont typeface="Wingdings 2"/>
+        <a:buChar char=""/>
+        <a:defRPr kumimoji="0" sz="2000" kern="1200">
           <a:solidFill>
             <a:schemeClr val="tx1"/>
           </a:solidFill>
@@ -2855,13 +2892,16 @@
           <a:cs typeface="+mn-cs"/>
         </a:defRPr>
       </a:lvl5pPr>
-      <a:lvl6pPr marL="2514600" indent="-228600" algn="l" defTabSz="914400" rtl="0" eaLnBrk="1" latinLnBrk="0" hangingPunct="1">
+      <a:lvl6pPr marL="1764792" indent="-182880" algn="l" rtl="0" eaLnBrk="1" latinLnBrk="0" hangingPunct="1">
         <a:spcBef>
           <a:spcPct val="20000"/>
         </a:spcBef>
-        <a:buFont typeface="Arial" pitchFamily="34" charset="0"/>
-        <a:buChar char="•"/>
-        <a:defRPr sz="2000" kern="1200">
+        <a:buClr>
+          <a:schemeClr val="tx1"/>
+        </a:buClr>
+        <a:buFont typeface="Wingdings 3"/>
+        <a:buChar char=""/>
+        <a:defRPr kumimoji="0" sz="1800" kern="1200">
           <a:solidFill>
             <a:schemeClr val="tx1"/>
           </a:solidFill>
@@ -2870,13 +2910,16 @@
           <a:cs typeface="+mn-cs"/>
         </a:defRPr>
       </a:lvl6pPr>
-      <a:lvl7pPr marL="2971800" indent="-228600" algn="l" defTabSz="914400" rtl="0" eaLnBrk="1" latinLnBrk="0" hangingPunct="1">
+      <a:lvl7pPr marL="1965960" indent="-182880" algn="l" rtl="0" eaLnBrk="1" latinLnBrk="0" hangingPunct="1">
         <a:spcBef>
           <a:spcPct val="20000"/>
         </a:spcBef>
-        <a:buFont typeface="Arial" pitchFamily="34" charset="0"/>
-        <a:buChar char="•"/>
-        <a:defRPr sz="2000" kern="1200">
+        <a:buClr>
+          <a:schemeClr val="tx1"/>
+        </a:buClr>
+        <a:buFont typeface="Wingdings 2"/>
+        <a:buChar char=""/>
+        <a:defRPr kumimoji="0" sz="1600" kern="1200">
           <a:solidFill>
             <a:schemeClr val="tx1"/>
           </a:solidFill>
@@ -2885,13 +2928,16 @@
           <a:cs typeface="+mn-cs"/>
         </a:defRPr>
       </a:lvl7pPr>
-      <a:lvl8pPr marL="3429000" indent="-228600" algn="l" defTabSz="914400" rtl="0" eaLnBrk="1" latinLnBrk="0" hangingPunct="1">
+      <a:lvl8pPr marL="2167128" indent="-182880" algn="l" rtl="0" eaLnBrk="1" latinLnBrk="0" hangingPunct="1">
         <a:spcBef>
           <a:spcPct val="20000"/>
         </a:spcBef>
-        <a:buFont typeface="Arial" pitchFamily="34" charset="0"/>
-        <a:buChar char="•"/>
-        <a:defRPr sz="2000" kern="1200">
+        <a:buClr>
+          <a:schemeClr val="tx1"/>
+        </a:buClr>
+        <a:buFont typeface="Wingdings 2"/>
+        <a:buChar char=""/>
+        <a:defRPr kumimoji="0" sz="1400" kern="1200">
           <a:solidFill>
             <a:schemeClr val="tx1"/>
           </a:solidFill>
@@ -2900,13 +2946,16 @@
           <a:cs typeface="+mn-cs"/>
         </a:defRPr>
       </a:lvl8pPr>
-      <a:lvl9pPr marL="3886200" indent="-228600" algn="l" defTabSz="914400" rtl="0" eaLnBrk="1" latinLnBrk="0" hangingPunct="1">
+      <a:lvl9pPr marL="2368296" indent="-182880" algn="l" rtl="0" eaLnBrk="1" latinLnBrk="0" hangingPunct="1">
         <a:spcBef>
           <a:spcPct val="20000"/>
         </a:spcBef>
-        <a:buFont typeface="Arial" pitchFamily="34" charset="0"/>
-        <a:buChar char="•"/>
-        <a:defRPr sz="2000" kern="1200">
+        <a:buClr>
+          <a:schemeClr val="tx1"/>
+        </a:buClr>
+        <a:buFont typeface="Wingdings 2"/>
+        <a:buChar char=""/>
+        <a:defRPr kumimoji="0" sz="1400" kern="1200" baseline="0">
           <a:solidFill>
             <a:schemeClr val="tx1"/>
           </a:solidFill>
@@ -2917,11 +2966,8 @@
       </a:lvl9pPr>
     </p:bodyStyle>
     <p:otherStyle>
-      <a:defPPr>
-        <a:defRPr lang="ru-RU"/>
-      </a:defPPr>
-      <a:lvl1pPr marL="0" algn="l" defTabSz="914400" rtl="0" eaLnBrk="1" latinLnBrk="0" hangingPunct="1">
-        <a:defRPr sz="1800" kern="1200">
+      <a:lvl1pPr marL="0" algn="l" rtl="0" eaLnBrk="1" latinLnBrk="0" hangingPunct="1">
+        <a:defRPr kumimoji="0" kern="1200">
           <a:solidFill>
             <a:schemeClr val="tx1"/>
           </a:solidFill>
@@ -2930,8 +2976,8 @@
           <a:cs typeface="+mn-cs"/>
         </a:defRPr>
       </a:lvl1pPr>
-      <a:lvl2pPr marL="457200" algn="l" defTabSz="914400" rtl="0" eaLnBrk="1" latinLnBrk="0" hangingPunct="1">
-        <a:defRPr sz="1800" kern="1200">
+      <a:lvl2pPr marL="457200" algn="l" rtl="0" eaLnBrk="1" latinLnBrk="0" hangingPunct="1">
+        <a:defRPr kumimoji="0" kern="1200">
           <a:solidFill>
             <a:schemeClr val="tx1"/>
           </a:solidFill>
@@ -2940,8 +2986,8 @@
           <a:cs typeface="+mn-cs"/>
         </a:defRPr>
       </a:lvl2pPr>
-      <a:lvl3pPr marL="914400" algn="l" defTabSz="914400" rtl="0" eaLnBrk="1" latinLnBrk="0" hangingPunct="1">
-        <a:defRPr sz="1800" kern="1200">
+      <a:lvl3pPr marL="914400" algn="l" rtl="0" eaLnBrk="1" latinLnBrk="0" hangingPunct="1">
+        <a:defRPr kumimoji="0" kern="1200">
           <a:solidFill>
             <a:schemeClr val="tx1"/>
           </a:solidFill>
@@ -2950,8 +2996,8 @@
           <a:cs typeface="+mn-cs"/>
         </a:defRPr>
       </a:lvl3pPr>
-      <a:lvl4pPr marL="1371600" algn="l" defTabSz="914400" rtl="0" eaLnBrk="1" latinLnBrk="0" hangingPunct="1">
-        <a:defRPr sz="1800" kern="1200">
+      <a:lvl4pPr marL="1371600" algn="l" rtl="0" eaLnBrk="1" latinLnBrk="0" hangingPunct="1">
+        <a:defRPr kumimoji="0" kern="1200">
           <a:solidFill>
             <a:schemeClr val="tx1"/>
           </a:solidFill>
@@ -2960,8 +3006,8 @@
           <a:cs typeface="+mn-cs"/>
         </a:defRPr>
       </a:lvl4pPr>
-      <a:lvl5pPr marL="1828800" algn="l" defTabSz="914400" rtl="0" eaLnBrk="1" latinLnBrk="0" hangingPunct="1">
-        <a:defRPr sz="1800" kern="1200">
+      <a:lvl5pPr marL="1828800" algn="l" rtl="0" eaLnBrk="1" latinLnBrk="0" hangingPunct="1">
+        <a:defRPr kumimoji="0" kern="1200">
           <a:solidFill>
             <a:schemeClr val="tx1"/>
           </a:solidFill>
@@ -2970,8 +3016,8 @@
           <a:cs typeface="+mn-cs"/>
         </a:defRPr>
       </a:lvl5pPr>
-      <a:lvl6pPr marL="2286000" algn="l" defTabSz="914400" rtl="0" eaLnBrk="1" latinLnBrk="0" hangingPunct="1">
-        <a:defRPr sz="1800" kern="1200">
+      <a:lvl6pPr marL="2286000" algn="l" rtl="0" eaLnBrk="1" latinLnBrk="0" hangingPunct="1">
+        <a:defRPr kumimoji="0" kern="1200">
           <a:solidFill>
             <a:schemeClr val="tx1"/>
           </a:solidFill>
@@ -2980,8 +3026,8 @@
           <a:cs typeface="+mn-cs"/>
         </a:defRPr>
       </a:lvl6pPr>
-      <a:lvl7pPr marL="2743200" algn="l" defTabSz="914400" rtl="0" eaLnBrk="1" latinLnBrk="0" hangingPunct="1">
-        <a:defRPr sz="1800" kern="1200">
+      <a:lvl7pPr marL="2743200" algn="l" rtl="0" eaLnBrk="1" latinLnBrk="0" hangingPunct="1">
+        <a:defRPr kumimoji="0" kern="1200">
           <a:solidFill>
             <a:schemeClr val="tx1"/>
           </a:solidFill>
@@ -2990,8 +3036,8 @@
           <a:cs typeface="+mn-cs"/>
         </a:defRPr>
       </a:lvl7pPr>
-      <a:lvl8pPr marL="3200400" algn="l" defTabSz="914400" rtl="0" eaLnBrk="1" latinLnBrk="0" hangingPunct="1">
-        <a:defRPr sz="1800" kern="1200">
+      <a:lvl8pPr marL="3200400" algn="l" rtl="0" eaLnBrk="1" latinLnBrk="0" hangingPunct="1">
+        <a:defRPr kumimoji="0" kern="1200">
           <a:solidFill>
             <a:schemeClr val="tx1"/>
           </a:solidFill>
@@ -3000,8 +3046,8 @@
           <a:cs typeface="+mn-cs"/>
         </a:defRPr>
       </a:lvl8pPr>
-      <a:lvl9pPr marL="3657600" algn="l" defTabSz="914400" rtl="0" eaLnBrk="1" latinLnBrk="0" hangingPunct="1">
-        <a:defRPr sz="1800" kern="1200">
+      <a:lvl9pPr marL="3657600" algn="l" rtl="0" eaLnBrk="1" latinLnBrk="0" hangingPunct="1">
+        <a:defRPr kumimoji="0" kern="1200">
           <a:solidFill>
             <a:schemeClr val="tx1"/>
           </a:solidFill>
@@ -3015,10 +3061,1243 @@
 </p:sldMaster>
 </file>
 
+<file path=ppt/slides/slide1.xml><?xml version="1.0" encoding="utf-8"?>
+<p:sld xmlns:a="http://schemas.openxmlformats.org/drawingml/2006/main" xmlns:r="http://schemas.openxmlformats.org/officeDocument/2006/relationships" xmlns:p="http://schemas.openxmlformats.org/presentationml/2006/main">
+  <p:cSld>
+    <p:spTree>
+      <p:nvGrpSpPr>
+        <p:cNvPr id="1" name=""/>
+        <p:cNvGrpSpPr/>
+        <p:nvPr/>
+      </p:nvGrpSpPr>
+      <p:grpSpPr>
+        <a:xfrm>
+          <a:off x="0" y="0"/>
+          <a:ext cx="0" cy="0"/>
+          <a:chOff x="0" y="0"/>
+          <a:chExt cx="0" cy="0"/>
+        </a:xfrm>
+      </p:grpSpPr>
+      <p:sp>
+        <p:nvSpPr>
+          <p:cNvPr id="2" name="Заголовок 1"/>
+          <p:cNvSpPr>
+            <a:spLocks noGrp="1"/>
+          </p:cNvSpPr>
+          <p:nvPr>
+            <p:ph type="ctrTitle"/>
+          </p:nvPr>
+        </p:nvSpPr>
+        <p:spPr/>
+        <p:txBody>
+          <a:bodyPr/>
+          <a:lstStyle/>
+          <a:p>
+            <a:r>
+              <a:rPr lang="en-US" dirty="0" smtClean="0">
+                <a:latin typeface="Times New Roman" pitchFamily="18" charset="0"/>
+                <a:cs typeface="Times New Roman" pitchFamily="18" charset="0"/>
+              </a:rPr>
+              <a:t>Abilympics2019</a:t>
+            </a:r>
+            <a:endParaRPr lang="ru-RU" dirty="0">
+              <a:latin typeface="Times New Roman" pitchFamily="18" charset="0"/>
+              <a:cs typeface="Times New Roman" pitchFamily="18" charset="0"/>
+            </a:endParaRPr>
+          </a:p>
+        </p:txBody>
+      </p:sp>
+      <p:sp>
+        <p:nvSpPr>
+          <p:cNvPr id="3" name="Подзаголовок 2"/>
+          <p:cNvSpPr>
+            <a:spLocks noGrp="1"/>
+          </p:cNvSpPr>
+          <p:nvPr>
+            <p:ph type="subTitle" idx="1"/>
+          </p:nvPr>
+        </p:nvSpPr>
+        <p:spPr/>
+        <p:txBody>
+          <a:bodyPr/>
+          <a:lstStyle/>
+          <a:p>
+            <a:r>
+              <a:rPr lang="ru-RU" dirty="0" smtClean="0"/>
+              <a:t>Выполнил участник чемпионата </a:t>
+            </a:r>
+            <a:r>
+              <a:rPr lang="en-US" dirty="0" smtClean="0"/>
+              <a:t>Abilympics:</a:t>
+            </a:r>
+            <a:r>
+              <a:rPr lang="ru-RU" dirty="0" smtClean="0"/>
+              <a:t> Мамыкин Глеб</a:t>
+            </a:r>
+            <a:endParaRPr lang="ru-RU" dirty="0"/>
+          </a:p>
+        </p:txBody>
+      </p:sp>
+    </p:spTree>
+  </p:cSld>
+  <p:clrMapOvr>
+    <a:masterClrMapping/>
+  </p:clrMapOvr>
+  <p:transition>
+    <p:push dir="d"/>
+  </p:transition>
+</p:sld>
+</file>
+
+<file path=ppt/slides/slide10.xml><?xml version="1.0" encoding="utf-8"?>
+<p:sld xmlns:a="http://schemas.openxmlformats.org/drawingml/2006/main" xmlns:r="http://schemas.openxmlformats.org/officeDocument/2006/relationships" xmlns:p="http://schemas.openxmlformats.org/presentationml/2006/main">
+  <p:cSld>
+    <p:spTree>
+      <p:nvGrpSpPr>
+        <p:cNvPr id="1" name=""/>
+        <p:cNvGrpSpPr/>
+        <p:nvPr/>
+      </p:nvGrpSpPr>
+      <p:grpSpPr>
+        <a:xfrm>
+          <a:off x="0" y="0"/>
+          <a:ext cx="0" cy="0"/>
+          <a:chOff x="0" y="0"/>
+          <a:chExt cx="0" cy="0"/>
+        </a:xfrm>
+      </p:grpSpPr>
+      <p:sp>
+        <p:nvSpPr>
+          <p:cNvPr id="2" name="Заголовок 1"/>
+          <p:cNvSpPr>
+            <a:spLocks noGrp="1"/>
+          </p:cNvSpPr>
+          <p:nvPr>
+            <p:ph type="title"/>
+          </p:nvPr>
+        </p:nvSpPr>
+        <p:spPr/>
+        <p:txBody>
+          <a:bodyPr/>
+          <a:lstStyle/>
+          <a:p>
+            <a:endParaRPr lang="ru-RU"/>
+          </a:p>
+        </p:txBody>
+      </p:sp>
+      <p:sp>
+        <p:nvSpPr>
+          <p:cNvPr id="3" name="Содержимое 2"/>
+          <p:cNvSpPr>
+            <a:spLocks noGrp="1"/>
+          </p:cNvSpPr>
+          <p:nvPr>
+            <p:ph idx="1"/>
+          </p:nvPr>
+        </p:nvSpPr>
+        <p:spPr/>
+        <p:txBody>
+          <a:bodyPr/>
+          <a:lstStyle/>
+          <a:p>
+            <a:endParaRPr lang="ru-RU"/>
+          </a:p>
+        </p:txBody>
+      </p:sp>
+    </p:spTree>
+  </p:cSld>
+  <p:clrMapOvr>
+    <a:masterClrMapping/>
+  </p:clrMapOvr>
+</p:sld>
+</file>
+
+<file path=ppt/slides/slide11.xml><?xml version="1.0" encoding="utf-8"?>
+<p:sld xmlns:a="http://schemas.openxmlformats.org/drawingml/2006/main" xmlns:r="http://schemas.openxmlformats.org/officeDocument/2006/relationships" xmlns:p="http://schemas.openxmlformats.org/presentationml/2006/main">
+  <p:cSld>
+    <p:spTree>
+      <p:nvGrpSpPr>
+        <p:cNvPr id="1" name=""/>
+        <p:cNvGrpSpPr/>
+        <p:nvPr/>
+      </p:nvGrpSpPr>
+      <p:grpSpPr>
+        <a:xfrm>
+          <a:off x="0" y="0"/>
+          <a:ext cx="0" cy="0"/>
+          <a:chOff x="0" y="0"/>
+          <a:chExt cx="0" cy="0"/>
+        </a:xfrm>
+      </p:grpSpPr>
+      <p:sp>
+        <p:nvSpPr>
+          <p:cNvPr id="2" name="Заголовок 1"/>
+          <p:cNvSpPr>
+            <a:spLocks noGrp="1"/>
+          </p:cNvSpPr>
+          <p:nvPr>
+            <p:ph type="title"/>
+          </p:nvPr>
+        </p:nvSpPr>
+        <p:spPr/>
+        <p:txBody>
+          <a:bodyPr/>
+          <a:lstStyle/>
+          <a:p>
+            <a:endParaRPr lang="ru-RU"/>
+          </a:p>
+        </p:txBody>
+      </p:sp>
+      <p:sp>
+        <p:nvSpPr>
+          <p:cNvPr id="3" name="Содержимое 2"/>
+          <p:cNvSpPr>
+            <a:spLocks noGrp="1"/>
+          </p:cNvSpPr>
+          <p:nvPr>
+            <p:ph idx="1"/>
+          </p:nvPr>
+        </p:nvSpPr>
+        <p:spPr/>
+        <p:txBody>
+          <a:bodyPr/>
+          <a:lstStyle/>
+          <a:p>
+            <a:endParaRPr lang="ru-RU"/>
+          </a:p>
+        </p:txBody>
+      </p:sp>
+    </p:spTree>
+  </p:cSld>
+  <p:clrMapOvr>
+    <a:masterClrMapping/>
+  </p:clrMapOvr>
+</p:sld>
+</file>
+
+<file path=ppt/slides/slide12.xml><?xml version="1.0" encoding="utf-8"?>
+<p:sld xmlns:a="http://schemas.openxmlformats.org/drawingml/2006/main" xmlns:r="http://schemas.openxmlformats.org/officeDocument/2006/relationships" xmlns:p="http://schemas.openxmlformats.org/presentationml/2006/main">
+  <p:cSld>
+    <p:spTree>
+      <p:nvGrpSpPr>
+        <p:cNvPr id="1" name=""/>
+        <p:cNvGrpSpPr/>
+        <p:nvPr/>
+      </p:nvGrpSpPr>
+      <p:grpSpPr>
+        <a:xfrm>
+          <a:off x="0" y="0"/>
+          <a:ext cx="0" cy="0"/>
+          <a:chOff x="0" y="0"/>
+          <a:chExt cx="0" cy="0"/>
+        </a:xfrm>
+      </p:grpSpPr>
+      <p:sp>
+        <p:nvSpPr>
+          <p:cNvPr id="2" name="Заголовок 1"/>
+          <p:cNvSpPr>
+            <a:spLocks noGrp="1"/>
+          </p:cNvSpPr>
+          <p:nvPr>
+            <p:ph type="title"/>
+          </p:nvPr>
+        </p:nvSpPr>
+        <p:spPr/>
+        <p:txBody>
+          <a:bodyPr/>
+          <a:lstStyle/>
+          <a:p>
+            <a:endParaRPr lang="ru-RU"/>
+          </a:p>
+        </p:txBody>
+      </p:sp>
+      <p:sp>
+        <p:nvSpPr>
+          <p:cNvPr id="3" name="Содержимое 2"/>
+          <p:cNvSpPr>
+            <a:spLocks noGrp="1"/>
+          </p:cNvSpPr>
+          <p:nvPr>
+            <p:ph idx="1"/>
+          </p:nvPr>
+        </p:nvSpPr>
+        <p:spPr/>
+        <p:txBody>
+          <a:bodyPr/>
+          <a:lstStyle/>
+          <a:p>
+            <a:endParaRPr lang="ru-RU"/>
+          </a:p>
+        </p:txBody>
+      </p:sp>
+    </p:spTree>
+  </p:cSld>
+  <p:clrMapOvr>
+    <a:masterClrMapping/>
+  </p:clrMapOvr>
+</p:sld>
+</file>
+
+<file path=ppt/slides/slide13.xml><?xml version="1.0" encoding="utf-8"?>
+<p:sld xmlns:a="http://schemas.openxmlformats.org/drawingml/2006/main" xmlns:r="http://schemas.openxmlformats.org/officeDocument/2006/relationships" xmlns:p="http://schemas.openxmlformats.org/presentationml/2006/main">
+  <p:cSld>
+    <p:spTree>
+      <p:nvGrpSpPr>
+        <p:cNvPr id="1" name=""/>
+        <p:cNvGrpSpPr/>
+        <p:nvPr/>
+      </p:nvGrpSpPr>
+      <p:grpSpPr>
+        <a:xfrm>
+          <a:off x="0" y="0"/>
+          <a:ext cx="0" cy="0"/>
+          <a:chOff x="0" y="0"/>
+          <a:chExt cx="0" cy="0"/>
+        </a:xfrm>
+      </p:grpSpPr>
+      <p:sp>
+        <p:nvSpPr>
+          <p:cNvPr id="2" name="Заголовок 1"/>
+          <p:cNvSpPr>
+            <a:spLocks noGrp="1"/>
+          </p:cNvSpPr>
+          <p:nvPr>
+            <p:ph type="title"/>
+          </p:nvPr>
+        </p:nvSpPr>
+        <p:spPr/>
+        <p:txBody>
+          <a:bodyPr/>
+          <a:lstStyle/>
+          <a:p>
+            <a:endParaRPr lang="ru-RU"/>
+          </a:p>
+        </p:txBody>
+      </p:sp>
+      <p:sp>
+        <p:nvSpPr>
+          <p:cNvPr id="3" name="Содержимое 2"/>
+          <p:cNvSpPr>
+            <a:spLocks noGrp="1"/>
+          </p:cNvSpPr>
+          <p:nvPr>
+            <p:ph idx="1"/>
+          </p:nvPr>
+        </p:nvSpPr>
+        <p:spPr/>
+        <p:txBody>
+          <a:bodyPr/>
+          <a:lstStyle/>
+          <a:p>
+            <a:endParaRPr lang="ru-RU"/>
+          </a:p>
+        </p:txBody>
+      </p:sp>
+    </p:spTree>
+  </p:cSld>
+  <p:clrMapOvr>
+    <a:masterClrMapping/>
+  </p:clrMapOvr>
+</p:sld>
+</file>
+
+<file path=ppt/slides/slide14.xml><?xml version="1.0" encoding="utf-8"?>
+<p:sld xmlns:a="http://schemas.openxmlformats.org/drawingml/2006/main" xmlns:r="http://schemas.openxmlformats.org/officeDocument/2006/relationships" xmlns:p="http://schemas.openxmlformats.org/presentationml/2006/main">
+  <p:cSld>
+    <p:spTree>
+      <p:nvGrpSpPr>
+        <p:cNvPr id="1" name=""/>
+        <p:cNvGrpSpPr/>
+        <p:nvPr/>
+      </p:nvGrpSpPr>
+      <p:grpSpPr>
+        <a:xfrm>
+          <a:off x="0" y="0"/>
+          <a:ext cx="0" cy="0"/>
+          <a:chOff x="0" y="0"/>
+          <a:chExt cx="0" cy="0"/>
+        </a:xfrm>
+      </p:grpSpPr>
+      <p:sp>
+        <p:nvSpPr>
+          <p:cNvPr id="2" name="Заголовок 1"/>
+          <p:cNvSpPr>
+            <a:spLocks noGrp="1"/>
+          </p:cNvSpPr>
+          <p:nvPr>
+            <p:ph type="title"/>
+          </p:nvPr>
+        </p:nvSpPr>
+        <p:spPr/>
+        <p:txBody>
+          <a:bodyPr/>
+          <a:lstStyle/>
+          <a:p>
+            <a:endParaRPr lang="ru-RU"/>
+          </a:p>
+        </p:txBody>
+      </p:sp>
+      <p:sp>
+        <p:nvSpPr>
+          <p:cNvPr id="3" name="Содержимое 2"/>
+          <p:cNvSpPr>
+            <a:spLocks noGrp="1"/>
+          </p:cNvSpPr>
+          <p:nvPr>
+            <p:ph idx="1"/>
+          </p:nvPr>
+        </p:nvSpPr>
+        <p:spPr/>
+        <p:txBody>
+          <a:bodyPr/>
+          <a:lstStyle/>
+          <a:p>
+            <a:endParaRPr lang="ru-RU"/>
+          </a:p>
+        </p:txBody>
+      </p:sp>
+    </p:spTree>
+  </p:cSld>
+  <p:clrMapOvr>
+    <a:masterClrMapping/>
+  </p:clrMapOvr>
+</p:sld>
+</file>
+
+<file path=ppt/slides/slide15.xml><?xml version="1.0" encoding="utf-8"?>
+<p:sld xmlns:a="http://schemas.openxmlformats.org/drawingml/2006/main" xmlns:r="http://schemas.openxmlformats.org/officeDocument/2006/relationships" xmlns:p="http://schemas.openxmlformats.org/presentationml/2006/main">
+  <p:cSld>
+    <p:spTree>
+      <p:nvGrpSpPr>
+        <p:cNvPr id="1" name=""/>
+        <p:cNvGrpSpPr/>
+        <p:nvPr/>
+      </p:nvGrpSpPr>
+      <p:grpSpPr>
+        <a:xfrm>
+          <a:off x="0" y="0"/>
+          <a:ext cx="0" cy="0"/>
+          <a:chOff x="0" y="0"/>
+          <a:chExt cx="0" cy="0"/>
+        </a:xfrm>
+      </p:grpSpPr>
+      <p:sp>
+        <p:nvSpPr>
+          <p:cNvPr id="2" name="Заголовок 1"/>
+          <p:cNvSpPr>
+            <a:spLocks noGrp="1"/>
+          </p:cNvSpPr>
+          <p:nvPr>
+            <p:ph type="title"/>
+          </p:nvPr>
+        </p:nvSpPr>
+        <p:spPr/>
+        <p:txBody>
+          <a:bodyPr/>
+          <a:lstStyle/>
+          <a:p>
+            <a:endParaRPr lang="ru-RU"/>
+          </a:p>
+        </p:txBody>
+      </p:sp>
+      <p:sp>
+        <p:nvSpPr>
+          <p:cNvPr id="3" name="Содержимое 2"/>
+          <p:cNvSpPr>
+            <a:spLocks noGrp="1"/>
+          </p:cNvSpPr>
+          <p:nvPr>
+            <p:ph idx="1"/>
+          </p:nvPr>
+        </p:nvSpPr>
+        <p:spPr/>
+        <p:txBody>
+          <a:bodyPr/>
+          <a:lstStyle/>
+          <a:p>
+            <a:endParaRPr lang="ru-RU"/>
+          </a:p>
+        </p:txBody>
+      </p:sp>
+    </p:spTree>
+  </p:cSld>
+  <p:clrMapOvr>
+    <a:masterClrMapping/>
+  </p:clrMapOvr>
+</p:sld>
+</file>
+
+<file path=ppt/slides/slide16.xml><?xml version="1.0" encoding="utf-8"?>
+<p:sld xmlns:a="http://schemas.openxmlformats.org/drawingml/2006/main" xmlns:r="http://schemas.openxmlformats.org/officeDocument/2006/relationships" xmlns:p="http://schemas.openxmlformats.org/presentationml/2006/main">
+  <p:cSld>
+    <p:spTree>
+      <p:nvGrpSpPr>
+        <p:cNvPr id="1" name=""/>
+        <p:cNvGrpSpPr/>
+        <p:nvPr/>
+      </p:nvGrpSpPr>
+      <p:grpSpPr>
+        <a:xfrm>
+          <a:off x="0" y="0"/>
+          <a:ext cx="0" cy="0"/>
+          <a:chOff x="0" y="0"/>
+          <a:chExt cx="0" cy="0"/>
+        </a:xfrm>
+      </p:grpSpPr>
+      <p:sp>
+        <p:nvSpPr>
+          <p:cNvPr id="2" name="Заголовок 1"/>
+          <p:cNvSpPr>
+            <a:spLocks noGrp="1"/>
+          </p:cNvSpPr>
+          <p:nvPr>
+            <p:ph type="title"/>
+          </p:nvPr>
+        </p:nvSpPr>
+        <p:spPr/>
+        <p:txBody>
+          <a:bodyPr/>
+          <a:lstStyle/>
+          <a:p>
+            <a:endParaRPr lang="ru-RU"/>
+          </a:p>
+        </p:txBody>
+      </p:sp>
+      <p:sp>
+        <p:nvSpPr>
+          <p:cNvPr id="3" name="Содержимое 2"/>
+          <p:cNvSpPr>
+            <a:spLocks noGrp="1"/>
+          </p:cNvSpPr>
+          <p:nvPr>
+            <p:ph idx="1"/>
+          </p:nvPr>
+        </p:nvSpPr>
+        <p:spPr/>
+        <p:txBody>
+          <a:bodyPr/>
+          <a:lstStyle/>
+          <a:p>
+            <a:endParaRPr lang="ru-RU"/>
+          </a:p>
+        </p:txBody>
+      </p:sp>
+    </p:spTree>
+  </p:cSld>
+  <p:clrMapOvr>
+    <a:masterClrMapping/>
+  </p:clrMapOvr>
+</p:sld>
+</file>
+
+<file path=ppt/slides/slide17.xml><?xml version="1.0" encoding="utf-8"?>
+<p:sld xmlns:a="http://schemas.openxmlformats.org/drawingml/2006/main" xmlns:r="http://schemas.openxmlformats.org/officeDocument/2006/relationships" xmlns:p="http://schemas.openxmlformats.org/presentationml/2006/main">
+  <p:cSld>
+    <p:spTree>
+      <p:nvGrpSpPr>
+        <p:cNvPr id="1" name=""/>
+        <p:cNvGrpSpPr/>
+        <p:nvPr/>
+      </p:nvGrpSpPr>
+      <p:grpSpPr>
+        <a:xfrm>
+          <a:off x="0" y="0"/>
+          <a:ext cx="0" cy="0"/>
+          <a:chOff x="0" y="0"/>
+          <a:chExt cx="0" cy="0"/>
+        </a:xfrm>
+      </p:grpSpPr>
+      <p:sp>
+        <p:nvSpPr>
+          <p:cNvPr id="2" name="Заголовок 1"/>
+          <p:cNvSpPr>
+            <a:spLocks noGrp="1"/>
+          </p:cNvSpPr>
+          <p:nvPr>
+            <p:ph type="title"/>
+          </p:nvPr>
+        </p:nvSpPr>
+        <p:spPr/>
+        <p:txBody>
+          <a:bodyPr/>
+          <a:lstStyle/>
+          <a:p>
+            <a:endParaRPr lang="ru-RU"/>
+          </a:p>
+        </p:txBody>
+      </p:sp>
+      <p:sp>
+        <p:nvSpPr>
+          <p:cNvPr id="3" name="Содержимое 2"/>
+          <p:cNvSpPr>
+            <a:spLocks noGrp="1"/>
+          </p:cNvSpPr>
+          <p:nvPr>
+            <p:ph idx="1"/>
+          </p:nvPr>
+        </p:nvSpPr>
+        <p:spPr/>
+        <p:txBody>
+          <a:bodyPr/>
+          <a:lstStyle/>
+          <a:p>
+            <a:endParaRPr lang="ru-RU" dirty="0"/>
+          </a:p>
+        </p:txBody>
+      </p:sp>
+    </p:spTree>
+  </p:cSld>
+  <p:clrMapOvr>
+    <a:masterClrMapping/>
+  </p:clrMapOvr>
+</p:sld>
+</file>
+
+<file path=ppt/slides/slide2.xml><?xml version="1.0" encoding="utf-8"?>
+<p:sld xmlns:a="http://schemas.openxmlformats.org/drawingml/2006/main" xmlns:r="http://schemas.openxmlformats.org/officeDocument/2006/relationships" xmlns:p="http://schemas.openxmlformats.org/presentationml/2006/main">
+  <p:cSld>
+    <p:spTree>
+      <p:nvGrpSpPr>
+        <p:cNvPr id="1" name=""/>
+        <p:cNvGrpSpPr/>
+        <p:nvPr/>
+      </p:nvGrpSpPr>
+      <p:grpSpPr>
+        <a:xfrm>
+          <a:off x="0" y="0"/>
+          <a:ext cx="0" cy="0"/>
+          <a:chOff x="0" y="0"/>
+          <a:chExt cx="0" cy="0"/>
+        </a:xfrm>
+      </p:grpSpPr>
+      <p:sp>
+        <p:nvSpPr>
+          <p:cNvPr id="2" name="Заголовок 1"/>
+          <p:cNvSpPr>
+            <a:spLocks noGrp="1"/>
+          </p:cNvSpPr>
+          <p:nvPr>
+            <p:ph type="title"/>
+          </p:nvPr>
+        </p:nvSpPr>
+        <p:spPr/>
+        <p:txBody>
+          <a:bodyPr/>
+          <a:lstStyle/>
+          <a:p>
+            <a:r>
+              <a:rPr lang="ru-RU" dirty="0" smtClean="0">
+                <a:latin typeface="+mn-lt"/>
+              </a:rPr>
+              <a:t>Содержание</a:t>
+            </a:r>
+            <a:endParaRPr lang="ru-RU" dirty="0">
+              <a:latin typeface="+mn-lt"/>
+            </a:endParaRPr>
+          </a:p>
+        </p:txBody>
+      </p:sp>
+      <p:sp>
+        <p:nvSpPr>
+          <p:cNvPr id="3" name="Содержимое 2"/>
+          <p:cNvSpPr>
+            <a:spLocks noGrp="1"/>
+          </p:cNvSpPr>
+          <p:nvPr>
+            <p:ph idx="1"/>
+          </p:nvPr>
+        </p:nvSpPr>
+        <p:spPr/>
+        <p:txBody>
+          <a:bodyPr/>
+          <a:lstStyle/>
+          <a:p>
+            <a:pPr marL="0" indent="268288">
+              <a:buFont typeface="+mj-lt"/>
+              <a:buAutoNum type="arabicPeriod"/>
+            </a:pPr>
+            <a:r>
+              <a:rPr lang="ru-RU" dirty="0" smtClean="0"/>
+              <a:t>Используемые средства разработки</a:t>
+            </a:r>
+          </a:p>
+          <a:p>
+            <a:pPr marL="0" indent="268288">
+              <a:buFont typeface="+mj-lt"/>
+              <a:buAutoNum type="arabicPeriod"/>
+            </a:pPr>
+            <a:r>
+              <a:rPr lang="ru-RU" dirty="0" smtClean="0"/>
+              <a:t>Описание приложения</a:t>
+            </a:r>
+          </a:p>
+          <a:p>
+            <a:pPr marL="0" indent="268288">
+              <a:buFont typeface="+mj-lt"/>
+              <a:buAutoNum type="arabicPeriod"/>
+            </a:pPr>
+            <a:r>
+              <a:rPr lang="ru-RU" dirty="0" smtClean="0"/>
+              <a:t>Демонстрация базы данных</a:t>
+            </a:r>
+            <a:endParaRPr lang="ru-RU" dirty="0" smtClean="0"/>
+          </a:p>
+          <a:p>
+            <a:pPr marL="0" indent="268288">
+              <a:buFont typeface="+mj-lt"/>
+              <a:buAutoNum type="arabicPeriod"/>
+            </a:pPr>
+            <a:r>
+              <a:rPr lang="ru-RU" dirty="0" smtClean="0"/>
+              <a:t>Демонстрация работы приложения</a:t>
+            </a:r>
+            <a:endParaRPr lang="ru-RU" dirty="0"/>
+          </a:p>
+        </p:txBody>
+      </p:sp>
+    </p:spTree>
+  </p:cSld>
+  <p:clrMapOvr>
+    <a:masterClrMapping/>
+  </p:clrMapOvr>
+</p:sld>
+</file>
+
+<file path=ppt/slides/slide3.xml><?xml version="1.0" encoding="utf-8"?>
+<p:sld xmlns:a="http://schemas.openxmlformats.org/drawingml/2006/main" xmlns:r="http://schemas.openxmlformats.org/officeDocument/2006/relationships" xmlns:p="http://schemas.openxmlformats.org/presentationml/2006/main">
+  <p:cSld>
+    <p:spTree>
+      <p:nvGrpSpPr>
+        <p:cNvPr id="1" name=""/>
+        <p:cNvGrpSpPr/>
+        <p:nvPr/>
+      </p:nvGrpSpPr>
+      <p:grpSpPr>
+        <a:xfrm>
+          <a:off x="0" y="0"/>
+          <a:ext cx="0" cy="0"/>
+          <a:chOff x="0" y="0"/>
+          <a:chExt cx="0" cy="0"/>
+        </a:xfrm>
+      </p:grpSpPr>
+      <p:sp>
+        <p:nvSpPr>
+          <p:cNvPr id="2" name="Заголовок 1"/>
+          <p:cNvSpPr>
+            <a:spLocks noGrp="1"/>
+          </p:cNvSpPr>
+          <p:nvPr>
+            <p:ph type="title"/>
+          </p:nvPr>
+        </p:nvSpPr>
+        <p:spPr/>
+        <p:txBody>
+          <a:bodyPr>
+            <a:normAutofit fontScale="90000"/>
+          </a:bodyPr>
+          <a:lstStyle/>
+          <a:p>
+            <a:r>
+              <a:rPr lang="ru-RU" dirty="0" smtClean="0">
+                <a:latin typeface="+mn-lt"/>
+              </a:rPr>
+              <a:t>Используемые средства разработки</a:t>
+            </a:r>
+            <a:endParaRPr lang="ru-RU" dirty="0">
+              <a:latin typeface="+mn-lt"/>
+            </a:endParaRPr>
+          </a:p>
+        </p:txBody>
+      </p:sp>
+      <p:sp>
+        <p:nvSpPr>
+          <p:cNvPr id="3" name="Содержимое 2"/>
+          <p:cNvSpPr>
+            <a:spLocks noGrp="1"/>
+          </p:cNvSpPr>
+          <p:nvPr>
+            <p:ph idx="1"/>
+          </p:nvPr>
+        </p:nvSpPr>
+        <p:spPr/>
+        <p:txBody>
+          <a:bodyPr/>
+          <a:lstStyle/>
+          <a:p>
+            <a:pPr marL="0" indent="268288">
+              <a:buNone/>
+            </a:pPr>
+            <a:r>
+              <a:rPr lang="ru-RU" dirty="0" smtClean="0"/>
+              <a:t>Для создания репозитория и связи с сервером мной использовалась программа </a:t>
+            </a:r>
+            <a:r>
+              <a:rPr lang="en-US" dirty="0" smtClean="0"/>
+              <a:t>Git.</a:t>
+            </a:r>
+          </a:p>
+          <a:p>
+            <a:pPr marL="0" indent="268288">
+              <a:buNone/>
+            </a:pPr>
+            <a:r>
+              <a:rPr lang="ru-RU" dirty="0" smtClean="0"/>
+              <a:t>Для создания базы данных мной использовалась программа </a:t>
+            </a:r>
+            <a:r>
+              <a:rPr lang="en-US" dirty="0" smtClean="0"/>
+              <a:t>Microsoft SQL Server 2014.</a:t>
+            </a:r>
+          </a:p>
+          <a:p>
+            <a:pPr marL="0" indent="268288">
+              <a:buNone/>
+            </a:pPr>
+            <a:r>
+              <a:rPr lang="ru-RU" dirty="0" smtClean="0"/>
+              <a:t>Для создания приложения мной использовались программа </a:t>
+            </a:r>
+            <a:r>
+              <a:rPr lang="en-US" dirty="0" smtClean="0"/>
+              <a:t>Microsoft Visual Studio 2019 </a:t>
+            </a:r>
+            <a:r>
+              <a:rPr lang="ru-RU" dirty="0" smtClean="0"/>
+              <a:t>и язык программирования </a:t>
+            </a:r>
+            <a:r>
+              <a:rPr lang="en-US" dirty="0" smtClean="0"/>
+              <a:t>C#.</a:t>
+            </a:r>
+            <a:r>
+              <a:rPr lang="ru-RU" dirty="0" smtClean="0"/>
+              <a:t> </a:t>
+            </a:r>
+            <a:endParaRPr lang="ru-RU" dirty="0"/>
+          </a:p>
+        </p:txBody>
+      </p:sp>
+    </p:spTree>
+  </p:cSld>
+  <p:clrMapOvr>
+    <a:masterClrMapping/>
+  </p:clrMapOvr>
+</p:sld>
+</file>
+
+<file path=ppt/slides/slide4.xml><?xml version="1.0" encoding="utf-8"?>
+<p:sld xmlns:a="http://schemas.openxmlformats.org/drawingml/2006/main" xmlns:r="http://schemas.openxmlformats.org/officeDocument/2006/relationships" xmlns:p="http://schemas.openxmlformats.org/presentationml/2006/main">
+  <p:cSld>
+    <p:spTree>
+      <p:nvGrpSpPr>
+        <p:cNvPr id="1" name=""/>
+        <p:cNvGrpSpPr/>
+        <p:nvPr/>
+      </p:nvGrpSpPr>
+      <p:grpSpPr>
+        <a:xfrm>
+          <a:off x="0" y="0"/>
+          <a:ext cx="0" cy="0"/>
+          <a:chOff x="0" y="0"/>
+          <a:chExt cx="0" cy="0"/>
+        </a:xfrm>
+      </p:grpSpPr>
+      <p:sp>
+        <p:nvSpPr>
+          <p:cNvPr id="2" name="Заголовок 1"/>
+          <p:cNvSpPr>
+            <a:spLocks noGrp="1"/>
+          </p:cNvSpPr>
+          <p:nvPr>
+            <p:ph type="title"/>
+          </p:nvPr>
+        </p:nvSpPr>
+        <p:spPr/>
+        <p:txBody>
+          <a:bodyPr/>
+          <a:lstStyle/>
+          <a:p>
+            <a:r>
+              <a:rPr lang="ru-RU" dirty="0" smtClean="0">
+                <a:latin typeface="+mn-lt"/>
+              </a:rPr>
+              <a:t>Описание приложения</a:t>
+            </a:r>
+            <a:endParaRPr lang="ru-RU" dirty="0">
+              <a:latin typeface="+mn-lt"/>
+            </a:endParaRPr>
+          </a:p>
+        </p:txBody>
+      </p:sp>
+      <p:sp>
+        <p:nvSpPr>
+          <p:cNvPr id="3" name="Содержимое 2"/>
+          <p:cNvSpPr>
+            <a:spLocks noGrp="1"/>
+          </p:cNvSpPr>
+          <p:nvPr>
+            <p:ph idx="1"/>
+          </p:nvPr>
+        </p:nvSpPr>
+        <p:spPr/>
+        <p:txBody>
+          <a:bodyPr/>
+          <a:lstStyle/>
+          <a:p>
+            <a:pPr marL="0" indent="268288">
+              <a:buNone/>
+            </a:pPr>
+            <a:r>
+              <a:rPr lang="ru-RU" dirty="0" smtClean="0"/>
+              <a:t>Приложение разработано для автоматизации работы технической </a:t>
+            </a:r>
+            <a:r>
+              <a:rPr lang="ru-RU" dirty="0" smtClean="0"/>
+              <a:t>поддержки</a:t>
+            </a:r>
+            <a:r>
+              <a:rPr lang="ru-RU" dirty="0" smtClean="0"/>
+              <a:t> предприятия. В приложении 3 типа ролей пользователей: сотрудник, специалист технической поддержки и техник. Приложение разработано таким образом, что сотрудник организации может оставить заявку через форму на ремонт компьютера, установку ПО, замену оборудования и прочее, а специалист </a:t>
+            </a:r>
+            <a:r>
+              <a:rPr lang="ru-RU" dirty="0" smtClean="0"/>
+              <a:t>технической </a:t>
+            </a:r>
+            <a:r>
+              <a:rPr lang="ru-RU" dirty="0" smtClean="0"/>
+              <a:t>поддержки может обработать полученную заявку.</a:t>
+            </a:r>
+            <a:endParaRPr lang="ru-RU" dirty="0"/>
+          </a:p>
+        </p:txBody>
+      </p:sp>
+    </p:spTree>
+  </p:cSld>
+  <p:clrMapOvr>
+    <a:masterClrMapping/>
+  </p:clrMapOvr>
+</p:sld>
+</file>
+
+<file path=ppt/slides/slide5.xml><?xml version="1.0" encoding="utf-8"?>
+<p:sld xmlns:a="http://schemas.openxmlformats.org/drawingml/2006/main" xmlns:r="http://schemas.openxmlformats.org/officeDocument/2006/relationships" xmlns:p="http://schemas.openxmlformats.org/presentationml/2006/main">
+  <p:cSld>
+    <p:spTree>
+      <p:nvGrpSpPr>
+        <p:cNvPr id="1" name=""/>
+        <p:cNvGrpSpPr/>
+        <p:nvPr/>
+      </p:nvGrpSpPr>
+      <p:grpSpPr>
+        <a:xfrm>
+          <a:off x="0" y="0"/>
+          <a:ext cx="0" cy="0"/>
+          <a:chOff x="0" y="0"/>
+          <a:chExt cx="0" cy="0"/>
+        </a:xfrm>
+      </p:grpSpPr>
+      <p:sp>
+        <p:nvSpPr>
+          <p:cNvPr id="2" name="Заголовок 1"/>
+          <p:cNvSpPr>
+            <a:spLocks noGrp="1"/>
+          </p:cNvSpPr>
+          <p:nvPr>
+            <p:ph type="title"/>
+          </p:nvPr>
+        </p:nvSpPr>
+        <p:spPr/>
+        <p:txBody>
+          <a:bodyPr/>
+          <a:lstStyle/>
+          <a:p>
+            <a:endParaRPr lang="ru-RU"/>
+          </a:p>
+        </p:txBody>
+      </p:sp>
+      <p:sp>
+        <p:nvSpPr>
+          <p:cNvPr id="3" name="Содержимое 2"/>
+          <p:cNvSpPr>
+            <a:spLocks noGrp="1"/>
+          </p:cNvSpPr>
+          <p:nvPr>
+            <p:ph idx="1"/>
+          </p:nvPr>
+        </p:nvSpPr>
+        <p:spPr/>
+        <p:txBody>
+          <a:bodyPr/>
+          <a:lstStyle/>
+          <a:p>
+            <a:endParaRPr lang="ru-RU"/>
+          </a:p>
+        </p:txBody>
+      </p:sp>
+    </p:spTree>
+  </p:cSld>
+  <p:clrMapOvr>
+    <a:masterClrMapping/>
+  </p:clrMapOvr>
+</p:sld>
+</file>
+
+<file path=ppt/slides/slide6.xml><?xml version="1.0" encoding="utf-8"?>
+<p:sld xmlns:a="http://schemas.openxmlformats.org/drawingml/2006/main" xmlns:r="http://schemas.openxmlformats.org/officeDocument/2006/relationships" xmlns:p="http://schemas.openxmlformats.org/presentationml/2006/main">
+  <p:cSld>
+    <p:spTree>
+      <p:nvGrpSpPr>
+        <p:cNvPr id="1" name=""/>
+        <p:cNvGrpSpPr/>
+        <p:nvPr/>
+      </p:nvGrpSpPr>
+      <p:grpSpPr>
+        <a:xfrm>
+          <a:off x="0" y="0"/>
+          <a:ext cx="0" cy="0"/>
+          <a:chOff x="0" y="0"/>
+          <a:chExt cx="0" cy="0"/>
+        </a:xfrm>
+      </p:grpSpPr>
+      <p:sp>
+        <p:nvSpPr>
+          <p:cNvPr id="2" name="Заголовок 1"/>
+          <p:cNvSpPr>
+            <a:spLocks noGrp="1"/>
+          </p:cNvSpPr>
+          <p:nvPr>
+            <p:ph type="title"/>
+          </p:nvPr>
+        </p:nvSpPr>
+        <p:spPr/>
+        <p:txBody>
+          <a:bodyPr/>
+          <a:lstStyle/>
+          <a:p>
+            <a:endParaRPr lang="ru-RU"/>
+          </a:p>
+        </p:txBody>
+      </p:sp>
+      <p:sp>
+        <p:nvSpPr>
+          <p:cNvPr id="3" name="Содержимое 2"/>
+          <p:cNvSpPr>
+            <a:spLocks noGrp="1"/>
+          </p:cNvSpPr>
+          <p:nvPr>
+            <p:ph idx="1"/>
+          </p:nvPr>
+        </p:nvSpPr>
+        <p:spPr/>
+        <p:txBody>
+          <a:bodyPr/>
+          <a:lstStyle/>
+          <a:p>
+            <a:endParaRPr lang="ru-RU"/>
+          </a:p>
+        </p:txBody>
+      </p:sp>
+    </p:spTree>
+  </p:cSld>
+  <p:clrMapOvr>
+    <a:masterClrMapping/>
+  </p:clrMapOvr>
+</p:sld>
+</file>
+
+<file path=ppt/slides/slide7.xml><?xml version="1.0" encoding="utf-8"?>
+<p:sld xmlns:a="http://schemas.openxmlformats.org/drawingml/2006/main" xmlns:r="http://schemas.openxmlformats.org/officeDocument/2006/relationships" xmlns:p="http://schemas.openxmlformats.org/presentationml/2006/main">
+  <p:cSld>
+    <p:spTree>
+      <p:nvGrpSpPr>
+        <p:cNvPr id="1" name=""/>
+        <p:cNvGrpSpPr/>
+        <p:nvPr/>
+      </p:nvGrpSpPr>
+      <p:grpSpPr>
+        <a:xfrm>
+          <a:off x="0" y="0"/>
+          <a:ext cx="0" cy="0"/>
+          <a:chOff x="0" y="0"/>
+          <a:chExt cx="0" cy="0"/>
+        </a:xfrm>
+      </p:grpSpPr>
+      <p:sp>
+        <p:nvSpPr>
+          <p:cNvPr id="2" name="Заголовок 1"/>
+          <p:cNvSpPr>
+            <a:spLocks noGrp="1"/>
+          </p:cNvSpPr>
+          <p:nvPr>
+            <p:ph type="title"/>
+          </p:nvPr>
+        </p:nvSpPr>
+        <p:spPr/>
+        <p:txBody>
+          <a:bodyPr/>
+          <a:lstStyle/>
+          <a:p>
+            <a:endParaRPr lang="ru-RU"/>
+          </a:p>
+        </p:txBody>
+      </p:sp>
+      <p:sp>
+        <p:nvSpPr>
+          <p:cNvPr id="3" name="Содержимое 2"/>
+          <p:cNvSpPr>
+            <a:spLocks noGrp="1"/>
+          </p:cNvSpPr>
+          <p:nvPr>
+            <p:ph idx="1"/>
+          </p:nvPr>
+        </p:nvSpPr>
+        <p:spPr/>
+        <p:txBody>
+          <a:bodyPr/>
+          <a:lstStyle/>
+          <a:p>
+            <a:endParaRPr lang="ru-RU"/>
+          </a:p>
+        </p:txBody>
+      </p:sp>
+    </p:spTree>
+  </p:cSld>
+  <p:clrMapOvr>
+    <a:masterClrMapping/>
+  </p:clrMapOvr>
+</p:sld>
+</file>
+
+<file path=ppt/slides/slide8.xml><?xml version="1.0" encoding="utf-8"?>
+<p:sld xmlns:a="http://schemas.openxmlformats.org/drawingml/2006/main" xmlns:r="http://schemas.openxmlformats.org/officeDocument/2006/relationships" xmlns:p="http://schemas.openxmlformats.org/presentationml/2006/main">
+  <p:cSld>
+    <p:spTree>
+      <p:nvGrpSpPr>
+        <p:cNvPr id="1" name=""/>
+        <p:cNvGrpSpPr/>
+        <p:nvPr/>
+      </p:nvGrpSpPr>
+      <p:grpSpPr>
+        <a:xfrm>
+          <a:off x="0" y="0"/>
+          <a:ext cx="0" cy="0"/>
+          <a:chOff x="0" y="0"/>
+          <a:chExt cx="0" cy="0"/>
+        </a:xfrm>
+      </p:grpSpPr>
+      <p:sp>
+        <p:nvSpPr>
+          <p:cNvPr id="2" name="Заголовок 1"/>
+          <p:cNvSpPr>
+            <a:spLocks noGrp="1"/>
+          </p:cNvSpPr>
+          <p:nvPr>
+            <p:ph type="title"/>
+          </p:nvPr>
+        </p:nvSpPr>
+        <p:spPr/>
+        <p:txBody>
+          <a:bodyPr/>
+          <a:lstStyle/>
+          <a:p>
+            <a:endParaRPr lang="ru-RU"/>
+          </a:p>
+        </p:txBody>
+      </p:sp>
+      <p:sp>
+        <p:nvSpPr>
+          <p:cNvPr id="3" name="Содержимое 2"/>
+          <p:cNvSpPr>
+            <a:spLocks noGrp="1"/>
+          </p:cNvSpPr>
+          <p:nvPr>
+            <p:ph idx="1"/>
+          </p:nvPr>
+        </p:nvSpPr>
+        <p:spPr/>
+        <p:txBody>
+          <a:bodyPr/>
+          <a:lstStyle/>
+          <a:p>
+            <a:endParaRPr lang="ru-RU"/>
+          </a:p>
+        </p:txBody>
+      </p:sp>
+    </p:spTree>
+  </p:cSld>
+  <p:clrMapOvr>
+    <a:masterClrMapping/>
+  </p:clrMapOvr>
+</p:sld>
+</file>
+
+<file path=ppt/slides/slide9.xml><?xml version="1.0" encoding="utf-8"?>
+<p:sld xmlns:a="http://schemas.openxmlformats.org/drawingml/2006/main" xmlns:r="http://schemas.openxmlformats.org/officeDocument/2006/relationships" xmlns:p="http://schemas.openxmlformats.org/presentationml/2006/main">
+  <p:cSld>
+    <p:spTree>
+      <p:nvGrpSpPr>
+        <p:cNvPr id="1" name=""/>
+        <p:cNvGrpSpPr/>
+        <p:nvPr/>
+      </p:nvGrpSpPr>
+      <p:grpSpPr>
+        <a:xfrm>
+          <a:off x="0" y="0"/>
+          <a:ext cx="0" cy="0"/>
+          <a:chOff x="0" y="0"/>
+          <a:chExt cx="0" cy="0"/>
+        </a:xfrm>
+      </p:grpSpPr>
+      <p:sp>
+        <p:nvSpPr>
+          <p:cNvPr id="2" name="Заголовок 1"/>
+          <p:cNvSpPr>
+            <a:spLocks noGrp="1"/>
+          </p:cNvSpPr>
+          <p:nvPr>
+            <p:ph type="title"/>
+          </p:nvPr>
+        </p:nvSpPr>
+        <p:spPr/>
+        <p:txBody>
+          <a:bodyPr/>
+          <a:lstStyle/>
+          <a:p>
+            <a:endParaRPr lang="ru-RU"/>
+          </a:p>
+        </p:txBody>
+      </p:sp>
+      <p:sp>
+        <p:nvSpPr>
+          <p:cNvPr id="3" name="Содержимое 2"/>
+          <p:cNvSpPr>
+            <a:spLocks noGrp="1"/>
+          </p:cNvSpPr>
+          <p:nvPr>
+            <p:ph idx="1"/>
+          </p:nvPr>
+        </p:nvSpPr>
+        <p:spPr/>
+        <p:txBody>
+          <a:bodyPr/>
+          <a:lstStyle/>
+          <a:p>
+            <a:endParaRPr lang="ru-RU"/>
+          </a:p>
+        </p:txBody>
+      </p:sp>
+    </p:spTree>
+  </p:cSld>
+  <p:clrMapOvr>
+    <a:masterClrMapping/>
+  </p:clrMapOvr>
+</p:sld>
+</file>
+
 <file path=ppt/theme/theme1.xml><?xml version="1.0" encoding="utf-8"?>
-<a:theme xmlns:a="http://schemas.openxmlformats.org/drawingml/2006/main" name="Тема Office">
+<a:theme xmlns:a="http://schemas.openxmlformats.org/drawingml/2006/main" name="Апекс">
   <a:themeElements>
-    <a:clrScheme name="Стандартная">
+    <a:clrScheme name="Апекс">
       <a:dk1>
         <a:sysClr val="windowText" lastClr="000000"/>
       </a:dk1>
@@ -3026,48 +4305,86 @@
         <a:sysClr val="window" lastClr="FFFFFF"/>
       </a:lt1>
       <a:dk2>
-        <a:srgbClr val="1F497D"/>
+        <a:srgbClr val="69676D"/>
       </a:dk2>
       <a:lt2>
-        <a:srgbClr val="EEECE1"/>
+        <a:srgbClr val="C9C2D1"/>
       </a:lt2>
       <a:accent1>
-        <a:srgbClr val="4F81BD"/>
+        <a:srgbClr val="CEB966"/>
       </a:accent1>
       <a:accent2>
-        <a:srgbClr val="C0504D"/>
+        <a:srgbClr val="9CB084"/>
       </a:accent2>
       <a:accent3>
-        <a:srgbClr val="9BBB59"/>
+        <a:srgbClr val="6BB1C9"/>
       </a:accent3>
       <a:accent4>
-        <a:srgbClr val="8064A2"/>
+        <a:srgbClr val="6585CF"/>
       </a:accent4>
       <a:accent5>
-        <a:srgbClr val="4BACC6"/>
+        <a:srgbClr val="7E6BC9"/>
       </a:accent5>
       <a:accent6>
-        <a:srgbClr val="F79646"/>
+        <a:srgbClr val="A379BB"/>
       </a:accent6>
       <a:hlink>
-        <a:srgbClr val="0000FF"/>
+        <a:srgbClr val="410082"/>
       </a:hlink>
       <a:folHlink>
-        <a:srgbClr val="800080"/>
+        <a:srgbClr val="932968"/>
       </a:folHlink>
     </a:clrScheme>
-    <a:fontScheme name="Стандартная">
+    <a:fontScheme name="Апекс">
       <a:majorFont>
-        <a:latin typeface="Calibri"/>
+        <a:latin typeface="Lucida Sans"/>
         <a:ea typeface=""/>
         <a:cs typeface=""/>
-        <a:font script="Jpan" typeface="ＭＳ Ｐゴシック"/>
-        <a:font script="Hang" typeface="맑은 고딕"/>
+        <a:font script="Grek" typeface="Arial"/>
+        <a:font script="Cyrl" typeface="Arial"/>
+        <a:font script="Jpan" typeface="HG丸ｺﾞｼｯｸM-PRO"/>
+        <a:font script="Hang" typeface="휴먼옛체"/>
+        <a:font script="Hans" typeface="黑体"/>
+        <a:font script="Hant" typeface="微軟正黑體"/>
+        <a:font script="Arab" typeface="Tahoma"/>
+        <a:font script="Hebr" typeface="Levenim MT"/>
+        <a:font script="Thai" typeface="FreesiaUPC"/>
+        <a:font script="Ethi" typeface="Nyala"/>
+        <a:font script="Beng" typeface="Vrinda"/>
+        <a:font script="Gujr" typeface="Shruti"/>
+        <a:font script="Khmr" typeface="DaunPenh"/>
+        <a:font script="Knda" typeface="Tunga"/>
+        <a:font script="Guru" typeface="Raavi"/>
+        <a:font script="Cans" typeface="Euphemia"/>
+        <a:font script="Cher" typeface="Plantagenet Cherokee"/>
+        <a:font script="Yiii" typeface="Microsoft Yi Baiti"/>
+        <a:font script="Tibt" typeface="Microsoft Himalaya"/>
+        <a:font script="Thaa" typeface="MV Boli"/>
+        <a:font script="Deva" typeface="Mangal"/>
+        <a:font script="Telu" typeface="Gautami"/>
+        <a:font script="Taml" typeface="Latha"/>
+        <a:font script="Syrc" typeface="Estrangelo Edessa"/>
+        <a:font script="Orya" typeface="Kalinga"/>
+        <a:font script="Mlym" typeface="Kartika"/>
+        <a:font script="Laoo" typeface="DokChampa"/>
+        <a:font script="Sinh" typeface="Iskoola Pota"/>
+        <a:font script="Mong" typeface="Mongolian Baiti"/>
+        <a:font script="Viet" typeface="Tahoma"/>
+        <a:font script="Uigh" typeface="Microsoft Uighur"/>
+      </a:majorFont>
+      <a:minorFont>
+        <a:latin typeface="Book Antiqua"/>
+        <a:ea typeface=""/>
+        <a:cs typeface=""/>
+        <a:font script="Grek" typeface="Times New Roman"/>
+        <a:font script="Cyrl" typeface="Times New Roman"/>
+        <a:font script="Jpan" typeface="HG明朝B"/>
+        <a:font script="Hang" typeface="돋움"/>
         <a:font script="Hans" typeface="宋体"/>
         <a:font script="Hant" typeface="新細明體"/>
         <a:font script="Arab" typeface="Times New Roman"/>
-        <a:font script="Hebr" typeface="Times New Roman"/>
-        <a:font script="Thai" typeface="Angsana New"/>
+        <a:font script="Hebr" typeface="David"/>
+        <a:font script="Thai" typeface="EucrosiaUPC"/>
         <a:font script="Ethi" typeface="Nyala"/>
         <a:font script="Beng" typeface="Vrinda"/>
         <a:font script="Gujr" typeface="Shruti"/>
@@ -3090,100 +4407,75 @@
         <a:font script="Mong" typeface="Mongolian Baiti"/>
         <a:font script="Viet" typeface="Times New Roman"/>
         <a:font script="Uigh" typeface="Microsoft Uighur"/>
-      </a:majorFont>
-      <a:minorFont>
-        <a:latin typeface="Calibri"/>
-        <a:ea typeface=""/>
-        <a:cs typeface=""/>
-        <a:font script="Jpan" typeface="ＭＳ Ｐゴシック"/>
-        <a:font script="Hang" typeface="맑은 고딕"/>
-        <a:font script="Hans" typeface="宋体"/>
-        <a:font script="Hant" typeface="新細明體"/>
-        <a:font script="Arab" typeface="Arial"/>
-        <a:font script="Hebr" typeface="Arial"/>
-        <a:font script="Thai" typeface="Cordia New"/>
-        <a:font script="Ethi" typeface="Nyala"/>
-        <a:font script="Beng" typeface="Vrinda"/>
-        <a:font script="Gujr" typeface="Shruti"/>
-        <a:font script="Khmr" typeface="DaunPenh"/>
-        <a:font script="Knda" typeface="Tunga"/>
-        <a:font script="Guru" typeface="Raavi"/>
-        <a:font script="Cans" typeface="Euphemia"/>
-        <a:font script="Cher" typeface="Plantagenet Cherokee"/>
-        <a:font script="Yiii" typeface="Microsoft Yi Baiti"/>
-        <a:font script="Tibt" typeface="Microsoft Himalaya"/>
-        <a:font script="Thaa" typeface="MV Boli"/>
-        <a:font script="Deva" typeface="Mangal"/>
-        <a:font script="Telu" typeface="Gautami"/>
-        <a:font script="Taml" typeface="Latha"/>
-        <a:font script="Syrc" typeface="Estrangelo Edessa"/>
-        <a:font script="Orya" typeface="Kalinga"/>
-        <a:font script="Mlym" typeface="Kartika"/>
-        <a:font script="Laoo" typeface="DokChampa"/>
-        <a:font script="Sinh" typeface="Iskoola Pota"/>
-        <a:font script="Mong" typeface="Mongolian Baiti"/>
-        <a:font script="Viet" typeface="Arial"/>
-        <a:font script="Uigh" typeface="Microsoft Uighur"/>
       </a:minorFont>
     </a:fontScheme>
-    <a:fmtScheme name="Стандартная">
+    <a:fmtScheme name="Апекс">
       <a:fillStyleLst>
         <a:solidFill>
           <a:schemeClr val="phClr"/>
         </a:solidFill>
         <a:gradFill rotWithShape="1">
           <a:gsLst>
-            <a:gs pos="0">
+            <a:gs pos="20000">
               <a:schemeClr val="phClr">
-                <a:tint val="50000"/>
-                <a:satMod val="300000"/>
-              </a:schemeClr>
-            </a:gs>
-            <a:gs pos="35000">
-              <a:schemeClr val="phClr">
-                <a:tint val="37000"/>
-                <a:satMod val="300000"/>
+                <a:tint val="9000"/>
               </a:schemeClr>
             </a:gs>
             <a:gs pos="100000">
               <a:schemeClr val="phClr">
-                <a:tint val="15000"/>
-                <a:satMod val="350000"/>
+                <a:tint val="70000"/>
+                <a:satMod val="100000"/>
               </a:schemeClr>
             </a:gs>
           </a:gsLst>
-          <a:lin ang="16200000" scaled="1"/>
+          <a:path path="circle">
+            <a:fillToRect l="-15000" t="-15000" r="115000" b="115000"/>
+          </a:path>
         </a:gradFill>
         <a:gradFill rotWithShape="1">
           <a:gsLst>
             <a:gs pos="0">
               <a:schemeClr val="phClr">
-                <a:shade val="51000"/>
-                <a:satMod val="130000"/>
+                <a:shade val="60000"/>
               </a:schemeClr>
             </a:gs>
-            <a:gs pos="80000">
+            <a:gs pos="33000">
               <a:schemeClr val="phClr">
-                <a:shade val="93000"/>
-                <a:satMod val="130000"/>
+                <a:tint val="86500"/>
+              </a:schemeClr>
+            </a:gs>
+            <a:gs pos="46750">
+              <a:schemeClr val="phClr">
+                <a:tint val="71000"/>
+                <a:satMod val="112000"/>
+              </a:schemeClr>
+            </a:gs>
+            <a:gs pos="53000">
+              <a:schemeClr val="phClr">
+                <a:tint val="71000"/>
+                <a:satMod val="112000"/>
+              </a:schemeClr>
+            </a:gs>
+            <a:gs pos="68000">
+              <a:schemeClr val="phClr">
+                <a:tint val="86000"/>
               </a:schemeClr>
             </a:gs>
             <a:gs pos="100000">
               <a:schemeClr val="phClr">
-                <a:shade val="94000"/>
-                <a:satMod val="135000"/>
+                <a:shade val="60000"/>
               </a:schemeClr>
             </a:gs>
           </a:gsLst>
-          <a:lin ang="16200000" scaled="0"/>
+          <a:lin ang="8350000" scaled="1"/>
         </a:gradFill>
       </a:fillStyleLst>
       <a:lnStyleLst>
         <a:ln w="9525" cap="flat" cmpd="sng" algn="ctr">
           <a:solidFill>
             <a:schemeClr val="phClr">
-              <a:shade val="95000"/>
-              <a:satMod val="105000"/>
+              <a:shade val="48000"/>
+              <a:satMod val="110000"/>
             </a:schemeClr>
           </a:solidFill>
           <a:prstDash val="solid"/>
@@ -3204,16 +4496,7 @@
       <a:effectStyleLst>
         <a:effectStyle>
           <a:effectLst>
-            <a:outerShdw blurRad="40000" dist="20000" dir="5400000" rotWithShape="0">
-              <a:srgbClr val="000000">
-                <a:alpha val="38000"/>
-              </a:srgbClr>
-            </a:outerShdw>
-          </a:effectLst>
-        </a:effectStyle>
-        <a:effectStyle>
-          <a:effectLst>
-            <a:outerShdw blurRad="40000" dist="23000" dir="5400000" rotWithShape="0">
+            <a:outerShdw blurRad="130000" dist="101600" dir="2700000" algn="tl" rotWithShape="0">
               <a:srgbClr val="000000">
                 <a:alpha val="35000"/>
               </a:srgbClr>
@@ -3222,22 +4505,31 @@
         </a:effectStyle>
         <a:effectStyle>
           <a:effectLst>
-            <a:outerShdw blurRad="40000" dist="23000" dir="5400000" rotWithShape="0">
+            <a:outerShdw blurRad="190500" dist="228600" dir="2700000" sy="90000" rotWithShape="0">
               <a:srgbClr val="000000">
-                <a:alpha val="35000"/>
+                <a:alpha val="25500"/>
+              </a:srgbClr>
+            </a:outerShdw>
+          </a:effectLst>
+        </a:effectStyle>
+        <a:effectStyle>
+          <a:effectLst>
+            <a:outerShdw blurRad="190500" dist="228600" dir="2700000" sy="90000" rotWithShape="0">
+              <a:srgbClr val="000000">
+                <a:alpha val="25500"/>
               </a:srgbClr>
             </a:outerShdw>
           </a:effectLst>
           <a:scene3d>
-            <a:camera prst="orthographicFront">
+            <a:camera prst="orthographicFront" fov="0">
               <a:rot lat="0" lon="0" rev="0"/>
             </a:camera>
-            <a:lightRig rig="threePt" dir="t">
-              <a:rot lat="0" lon="0" rev="1200000"/>
+            <a:lightRig rig="soft" dir="tl">
+              <a:rot lat="0" lon="0" rev="20100000"/>
             </a:lightRig>
           </a:scene3d>
           <a:sp3d>
-            <a:bevelT w="63500" h="25400"/>
+            <a:bevelT w="50800" h="50800"/>
           </a:sp3d>
         </a:effectStyle>
       </a:effectStyleLst>
@@ -3249,47 +4541,38 @@
           <a:gsLst>
             <a:gs pos="0">
               <a:schemeClr val="phClr">
-                <a:tint val="40000"/>
-                <a:satMod val="350000"/>
-              </a:schemeClr>
-            </a:gs>
-            <a:gs pos="40000">
-              <a:schemeClr val="phClr">
-                <a:tint val="45000"/>
-                <a:shade val="99000"/>
-                <a:satMod val="350000"/>
+                <a:tint val="50000"/>
+                <a:satMod val="180000"/>
               </a:schemeClr>
             </a:gs>
             <a:gs pos="100000">
               <a:schemeClr val="phClr">
-                <a:shade val="20000"/>
-                <a:satMod val="255000"/>
+                <a:shade val="45000"/>
+                <a:satMod val="120000"/>
               </a:schemeClr>
             </a:gs>
           </a:gsLst>
           <a:path path="circle">
-            <a:fillToRect l="50000" t="-80000" r="50000" b="180000"/>
+            <a:fillToRect r="100000" b="100000"/>
           </a:path>
         </a:gradFill>
-        <a:gradFill rotWithShape="1">
-          <a:gsLst>
-            <a:gs pos="0">
+        <a:blipFill>
+          <a:blip xmlns:r="http://schemas.openxmlformats.org/officeDocument/2006/relationships" r:embed="rId1">
+            <a:duotone>
               <a:schemeClr val="phClr">
-                <a:tint val="80000"/>
-                <a:satMod val="300000"/>
+                <a:shade val="3000"/>
+                <a:satMod val="110000"/>
               </a:schemeClr>
-            </a:gs>
-            <a:gs pos="100000">
               <a:schemeClr val="phClr">
-                <a:shade val="30000"/>
-                <a:satMod val="200000"/>
+                <a:tint val="60000"/>
+                <a:satMod val="425000"/>
               </a:schemeClr>
-            </a:gs>
-          </a:gsLst>
-          <a:path path="circle">
-            <a:fillToRect l="50000" t="50000" r="50000" b="50000"/>
-          </a:path>
-        </a:gradFill>
+            </a:duotone>
+          </a:blip>
+          <a:stretch>
+            <a:fillRect/>
+          </a:stretch>
+        </a:blipFill>
       </a:bgFillStyleLst>
     </a:fmtScheme>
   </a:themeElements>

</xml_diff>